<commit_message>
Update ListTagsCommand sequence diagram
Update sequence diagram with new colour coding theme. Fix erroneous
arrows. Fix erroneous diagramming.
</commit_message>
<xml_diff>
--- a/docs/diagrams/ListTagsSequenceDiagram.pptx
+++ b/docs/diagrams/ListTagsSequenceDiagram.pptx
@@ -138,13 +138,357 @@
 <file path=ppt/revisionInfo.xml><?xml version="1.0" encoding="utf-8"?>
 <p1510:revInfo xmlns:a="http://schemas.openxmlformats.org/drawingml/2006/main" xmlns:r="http://schemas.openxmlformats.org/officeDocument/2006/relationships" xmlns:p1510="http://schemas.microsoft.com/office/powerpoint/2015/10/main">
   <p1510:revLst>
-    <p1510:client id="{C1F0BA41-C8CE-9742-B8A4-4E6CD10D2C20}" v="40" dt="2019-03-29T14:33:16.146"/>
+    <p1510:client id="{1F7A6D7A-23B7-1A44-A144-E948BBF855BF}" v="15" dt="2019-04-10T12:55:33.886"/>
   </p1510:revLst>
 </p1510:revInfo>
 </file>
 
 <file path=ppt/changesInfos/changesInfo1.xml><?xml version="1.0" encoding="utf-8"?>
 <pc:chgInfo xmlns:a="http://schemas.openxmlformats.org/drawingml/2006/main" xmlns:r="http://schemas.openxmlformats.org/officeDocument/2006/relationships" xmlns:ac="http://schemas.microsoft.com/office/drawing/2013/main/command" xmlns:pc="http://schemas.microsoft.com/office/powerpoint/2013/main/command">
+  <pc:docChgLst>
+    <pc:chgData name="Ian Wu Ling En" userId="28715549-2f5c-46f8-b7f8-f39c35f3312d" providerId="ADAL" clId="{1F7A6D7A-23B7-1A44-A144-E948BBF855BF}"/>
+    <pc:docChg chg="undo custSel modSld">
+      <pc:chgData name="Ian Wu Ling En" userId="28715549-2f5c-46f8-b7f8-f39c35f3312d" providerId="ADAL" clId="{1F7A6D7A-23B7-1A44-A144-E948BBF855BF}" dt="2019-04-10T12:58:34.283" v="119" actId="1076"/>
+      <pc:docMkLst>
+        <pc:docMk/>
+      </pc:docMkLst>
+      <pc:sldChg chg="addSp modSp">
+        <pc:chgData name="Ian Wu Ling En" userId="28715549-2f5c-46f8-b7f8-f39c35f3312d" providerId="ADAL" clId="{1F7A6D7A-23B7-1A44-A144-E948BBF855BF}" dt="2019-04-10T12:58:34.283" v="119" actId="1076"/>
+        <pc:sldMkLst>
+          <pc:docMk/>
+          <pc:sldMk cId="3945898909" sldId="267"/>
+        </pc:sldMkLst>
+        <pc:spChg chg="mod">
+          <ac:chgData name="Ian Wu Ling En" userId="28715549-2f5c-46f8-b7f8-f39c35f3312d" providerId="ADAL" clId="{1F7A6D7A-23B7-1A44-A144-E948BBF855BF}" dt="2019-04-10T12:49:37.053" v="3" actId="403"/>
+          <ac:spMkLst>
+            <pc:docMk/>
+            <pc:sldMk cId="3945898909" sldId="267"/>
+            <ac:spMk id="2" creationId="{00000000-0000-0000-0000-000000000000}"/>
+          </ac:spMkLst>
+        </pc:spChg>
+        <pc:spChg chg="mod">
+          <ac:chgData name="Ian Wu Ling En" userId="28715549-2f5c-46f8-b7f8-f39c35f3312d" providerId="ADAL" clId="{1F7A6D7A-23B7-1A44-A144-E948BBF855BF}" dt="2019-04-10T12:49:37.053" v="3" actId="403"/>
+          <ac:spMkLst>
+            <pc:docMk/>
+            <pc:sldMk cId="3945898909" sldId="267"/>
+            <ac:spMk id="16" creationId="{00000000-0000-0000-0000-000000000000}"/>
+          </ac:spMkLst>
+        </pc:spChg>
+        <pc:spChg chg="mod">
+          <ac:chgData name="Ian Wu Ling En" userId="28715549-2f5c-46f8-b7f8-f39c35f3312d" providerId="ADAL" clId="{1F7A6D7A-23B7-1A44-A144-E948BBF855BF}" dt="2019-04-10T12:54:27.966" v="64" actId="14100"/>
+          <ac:spMkLst>
+            <pc:docMk/>
+            <pc:sldMk cId="3945898909" sldId="267"/>
+            <ac:spMk id="18" creationId="{00000000-0000-0000-0000-000000000000}"/>
+          </ac:spMkLst>
+        </pc:spChg>
+        <pc:spChg chg="add mod">
+          <ac:chgData name="Ian Wu Ling En" userId="28715549-2f5c-46f8-b7f8-f39c35f3312d" providerId="ADAL" clId="{1F7A6D7A-23B7-1A44-A144-E948BBF855BF}" dt="2019-04-10T12:55:21.181" v="102" actId="1076"/>
+          <ac:spMkLst>
+            <pc:docMk/>
+            <pc:sldMk cId="3945898909" sldId="267"/>
+            <ac:spMk id="63" creationId="{ED3CCE40-81F3-CB41-9A71-B582AACA7EC9}"/>
+          </ac:spMkLst>
+        </pc:spChg>
+        <pc:spChg chg="mod">
+          <ac:chgData name="Ian Wu Ling En" userId="28715549-2f5c-46f8-b7f8-f39c35f3312d" providerId="ADAL" clId="{1F7A6D7A-23B7-1A44-A144-E948BBF855BF}" dt="2019-04-10T12:55:15.274" v="100" actId="1076"/>
+          <ac:spMkLst>
+            <pc:docMk/>
+            <pc:sldMk cId="3945898909" sldId="267"/>
+            <ac:spMk id="65" creationId="{00000000-0000-0000-0000-000000000000}"/>
+          </ac:spMkLst>
+        </pc:spChg>
+        <pc:spChg chg="mod">
+          <ac:chgData name="Ian Wu Ling En" userId="28715549-2f5c-46f8-b7f8-f39c35f3312d" providerId="ADAL" clId="{1F7A6D7A-23B7-1A44-A144-E948BBF855BF}" dt="2019-04-10T12:49:37.053" v="3" actId="403"/>
+          <ac:spMkLst>
+            <pc:docMk/>
+            <pc:sldMk cId="3945898909" sldId="267"/>
+            <ac:spMk id="73" creationId="{6BE0EE90-E7A8-43C8-A9B8-904835775906}"/>
+          </ac:spMkLst>
+        </pc:spChg>
+        <pc:spChg chg="mod">
+          <ac:chgData name="Ian Wu Ling En" userId="28715549-2f5c-46f8-b7f8-f39c35f3312d" providerId="ADAL" clId="{1F7A6D7A-23B7-1A44-A144-E948BBF855BF}" dt="2019-04-10T12:54:45.152" v="70" actId="1076"/>
+          <ac:spMkLst>
+            <pc:docMk/>
+            <pc:sldMk cId="3945898909" sldId="267"/>
+            <ac:spMk id="109" creationId="{1D72095B-BD52-514E-8588-772FF137502C}"/>
+          </ac:spMkLst>
+        </pc:spChg>
+        <pc:spChg chg="mod">
+          <ac:chgData name="Ian Wu Ling En" userId="28715549-2f5c-46f8-b7f8-f39c35f3312d" providerId="ADAL" clId="{1F7A6D7A-23B7-1A44-A144-E948BBF855BF}" dt="2019-04-10T12:51:39.874" v="22" actId="166"/>
+          <ac:spMkLst>
+            <pc:docMk/>
+            <pc:sldMk cId="3945898909" sldId="267"/>
+            <ac:spMk id="160" creationId="{BB7E46E7-A8BC-804A-81B1-D7AB1D98FE3E}"/>
+          </ac:spMkLst>
+        </pc:spChg>
+        <pc:spChg chg="mod">
+          <ac:chgData name="Ian Wu Ling En" userId="28715549-2f5c-46f8-b7f8-f39c35f3312d" providerId="ADAL" clId="{1F7A6D7A-23B7-1A44-A144-E948BBF855BF}" dt="2019-04-10T12:56:08.485" v="111" actId="14100"/>
+          <ac:spMkLst>
+            <pc:docMk/>
+            <pc:sldMk cId="3945898909" sldId="267"/>
+            <ac:spMk id="161" creationId="{102AE146-E304-4F4C-8D37-BE8EEFF3CAD5}"/>
+          </ac:spMkLst>
+        </pc:spChg>
+        <pc:spChg chg="mod">
+          <ac:chgData name="Ian Wu Ling En" userId="28715549-2f5c-46f8-b7f8-f39c35f3312d" providerId="ADAL" clId="{1F7A6D7A-23B7-1A44-A144-E948BBF855BF}" dt="2019-04-10T12:51:09.942" v="16" actId="1076"/>
+          <ac:spMkLst>
+            <pc:docMk/>
+            <pc:sldMk cId="3945898909" sldId="267"/>
+            <ac:spMk id="170" creationId="{29F5FCDF-87B5-4F44-BB5E-5AFE8A19813B}"/>
+          </ac:spMkLst>
+        </pc:spChg>
+        <pc:spChg chg="mod">
+          <ac:chgData name="Ian Wu Ling En" userId="28715549-2f5c-46f8-b7f8-f39c35f3312d" providerId="ADAL" clId="{1F7A6D7A-23B7-1A44-A144-E948BBF855BF}" dt="2019-04-10T12:52:35.317" v="36" actId="14100"/>
+          <ac:spMkLst>
+            <pc:docMk/>
+            <pc:sldMk cId="3945898909" sldId="267"/>
+            <ac:spMk id="172" creationId="{7AE6C50E-906C-2C47-A0B7-0D79836B876A}"/>
+          </ac:spMkLst>
+        </pc:spChg>
+        <pc:spChg chg="mod">
+          <ac:chgData name="Ian Wu Ling En" userId="28715549-2f5c-46f8-b7f8-f39c35f3312d" providerId="ADAL" clId="{1F7A6D7A-23B7-1A44-A144-E948BBF855BF}" dt="2019-04-10T12:56:10.285" v="112" actId="20577"/>
+          <ac:spMkLst>
+            <pc:docMk/>
+            <pc:sldMk cId="3945898909" sldId="267"/>
+            <ac:spMk id="176" creationId="{0E77DE98-5DAE-9345-B901-60D93302A2AA}"/>
+          </ac:spMkLst>
+        </pc:spChg>
+        <pc:spChg chg="mod">
+          <ac:chgData name="Ian Wu Ling En" userId="28715549-2f5c-46f8-b7f8-f39c35f3312d" providerId="ADAL" clId="{1F7A6D7A-23B7-1A44-A144-E948BBF855BF}" dt="2019-04-10T12:51:35.045" v="21" actId="1076"/>
+          <ac:spMkLst>
+            <pc:docMk/>
+            <pc:sldMk cId="3945898909" sldId="267"/>
+            <ac:spMk id="177" creationId="{EFDDE99B-1BE6-4047-AF54-808013097CEB}"/>
+          </ac:spMkLst>
+        </pc:spChg>
+        <pc:spChg chg="mod">
+          <ac:chgData name="Ian Wu Ling En" userId="28715549-2f5c-46f8-b7f8-f39c35f3312d" providerId="ADAL" clId="{1F7A6D7A-23B7-1A44-A144-E948BBF855BF}" dt="2019-04-10T12:52:17.048" v="31" actId="20577"/>
+          <ac:spMkLst>
+            <pc:docMk/>
+            <pc:sldMk cId="3945898909" sldId="267"/>
+            <ac:spMk id="179" creationId="{C54884FA-4855-A14F-A52F-79B09230E772}"/>
+          </ac:spMkLst>
+        </pc:spChg>
+        <pc:spChg chg="mod">
+          <ac:chgData name="Ian Wu Ling En" userId="28715549-2f5c-46f8-b7f8-f39c35f3312d" providerId="ADAL" clId="{1F7A6D7A-23B7-1A44-A144-E948BBF855BF}" dt="2019-04-10T12:52:43.296" v="40" actId="20577"/>
+          <ac:spMkLst>
+            <pc:docMk/>
+            <pc:sldMk cId="3945898909" sldId="267"/>
+            <ac:spMk id="180" creationId="{E92481ED-4455-0240-BFBD-68D36A61410A}"/>
+          </ac:spMkLst>
+        </pc:spChg>
+        <pc:spChg chg="mod">
+          <ac:chgData name="Ian Wu Ling En" userId="28715549-2f5c-46f8-b7f8-f39c35f3312d" providerId="ADAL" clId="{1F7A6D7A-23B7-1A44-A144-E948BBF855BF}" dt="2019-04-10T12:52:13.145" v="30" actId="2085"/>
+          <ac:spMkLst>
+            <pc:docMk/>
+            <pc:sldMk cId="3945898909" sldId="267"/>
+            <ac:spMk id="182" creationId="{88563E02-6785-EE4E-A755-952CA1759026}"/>
+          </ac:spMkLst>
+        </pc:spChg>
+        <pc:spChg chg="mod">
+          <ac:chgData name="Ian Wu Ling En" userId="28715549-2f5c-46f8-b7f8-f39c35f3312d" providerId="ADAL" clId="{1F7A6D7A-23B7-1A44-A144-E948BBF855BF}" dt="2019-04-10T12:49:37.053" v="3" actId="403"/>
+          <ac:spMkLst>
+            <pc:docMk/>
+            <pc:sldMk cId="3945898909" sldId="267"/>
+            <ac:spMk id="194" creationId="{DE70DFD2-865A-DD42-A326-95B0790E6D13}"/>
+          </ac:spMkLst>
+        </pc:spChg>
+        <pc:spChg chg="mod">
+          <ac:chgData name="Ian Wu Ling En" userId="28715549-2f5c-46f8-b7f8-f39c35f3312d" providerId="ADAL" clId="{1F7A6D7A-23B7-1A44-A144-E948BBF855BF}" dt="2019-04-10T12:49:37.053" v="3" actId="403"/>
+          <ac:spMkLst>
+            <pc:docMk/>
+            <pc:sldMk cId="3945898909" sldId="267"/>
+            <ac:spMk id="195" creationId="{50C526CB-83CB-B34F-BB22-921C30DE14FB}"/>
+          </ac:spMkLst>
+        </pc:spChg>
+        <pc:spChg chg="mod">
+          <ac:chgData name="Ian Wu Ling En" userId="28715549-2f5c-46f8-b7f8-f39c35f3312d" providerId="ADAL" clId="{1F7A6D7A-23B7-1A44-A144-E948BBF855BF}" dt="2019-04-10T12:55:51.280" v="106" actId="14100"/>
+          <ac:spMkLst>
+            <pc:docMk/>
+            <pc:sldMk cId="3945898909" sldId="267"/>
+            <ac:spMk id="199" creationId="{DC5E1940-1F87-6040-9991-A05EE3D57BFE}"/>
+          </ac:spMkLst>
+        </pc:spChg>
+        <pc:spChg chg="mod">
+          <ac:chgData name="Ian Wu Ling En" userId="28715549-2f5c-46f8-b7f8-f39c35f3312d" providerId="ADAL" clId="{1F7A6D7A-23B7-1A44-A144-E948BBF855BF}" dt="2019-04-10T12:56:01.503" v="109" actId="14100"/>
+          <ac:spMkLst>
+            <pc:docMk/>
+            <pc:sldMk cId="3945898909" sldId="267"/>
+            <ac:spMk id="202" creationId="{8C056988-5E64-0D43-A768-9F5F50B8A737}"/>
+          </ac:spMkLst>
+        </pc:spChg>
+        <pc:grpChg chg="mod">
+          <ac:chgData name="Ian Wu Ling En" userId="28715549-2f5c-46f8-b7f8-f39c35f3312d" providerId="ADAL" clId="{1F7A6D7A-23B7-1A44-A144-E948BBF855BF}" dt="2019-04-10T12:55:53.715" v="107" actId="14100"/>
+          <ac:grpSpMkLst>
+            <pc:docMk/>
+            <pc:sldMk cId="3945898909" sldId="267"/>
+            <ac:grpSpMk id="193" creationId="{2CD6D683-B138-1045-ACD8-4CB62ED69530}"/>
+          </ac:grpSpMkLst>
+        </pc:grpChg>
+        <pc:cxnChg chg="mod">
+          <ac:chgData name="Ian Wu Ling En" userId="28715549-2f5c-46f8-b7f8-f39c35f3312d" providerId="ADAL" clId="{1F7A6D7A-23B7-1A44-A144-E948BBF855BF}" dt="2019-04-10T12:55:27.610" v="103" actId="14100"/>
+          <ac:cxnSpMkLst>
+            <pc:docMk/>
+            <pc:sldMk cId="3945898909" sldId="267"/>
+            <ac:cxnSpMk id="17" creationId="{00000000-0000-0000-0000-000000000000}"/>
+          </ac:cxnSpMkLst>
+        </pc:cxnChg>
+        <pc:cxnChg chg="mod">
+          <ac:chgData name="Ian Wu Ling En" userId="28715549-2f5c-46f8-b7f8-f39c35f3312d" providerId="ADAL" clId="{1F7A6D7A-23B7-1A44-A144-E948BBF855BF}" dt="2019-04-10T12:49:23.073" v="0" actId="14100"/>
+          <ac:cxnSpMkLst>
+            <pc:docMk/>
+            <pc:sldMk cId="3945898909" sldId="267"/>
+            <ac:cxnSpMk id="23" creationId="{00000000-0000-0000-0000-000000000000}"/>
+          </ac:cxnSpMkLst>
+        </pc:cxnChg>
+        <pc:cxnChg chg="mod">
+          <ac:chgData name="Ian Wu Ling En" userId="28715549-2f5c-46f8-b7f8-f39c35f3312d" providerId="ADAL" clId="{1F7A6D7A-23B7-1A44-A144-E948BBF855BF}" dt="2019-04-10T12:53:45.984" v="52" actId="1076"/>
+          <ac:cxnSpMkLst>
+            <pc:docMk/>
+            <pc:sldMk cId="3945898909" sldId="267"/>
+            <ac:cxnSpMk id="28" creationId="{00000000-0000-0000-0000-000000000000}"/>
+          </ac:cxnSpMkLst>
+        </pc:cxnChg>
+        <pc:cxnChg chg="mod">
+          <ac:chgData name="Ian Wu Ling En" userId="28715549-2f5c-46f8-b7f8-f39c35f3312d" providerId="ADAL" clId="{1F7A6D7A-23B7-1A44-A144-E948BBF855BF}" dt="2019-04-10T12:57:53.174" v="116" actId="14100"/>
+          <ac:cxnSpMkLst>
+            <pc:docMk/>
+            <pc:sldMk cId="3945898909" sldId="267"/>
+            <ac:cxnSpMk id="35" creationId="{00000000-0000-0000-0000-000000000000}"/>
+          </ac:cxnSpMkLst>
+        </pc:cxnChg>
+        <pc:cxnChg chg="add mod">
+          <ac:chgData name="Ian Wu Ling En" userId="28715549-2f5c-46f8-b7f8-f39c35f3312d" providerId="ADAL" clId="{1F7A6D7A-23B7-1A44-A144-E948BBF855BF}" dt="2019-04-10T12:54:58.958" v="96" actId="1076"/>
+          <ac:cxnSpMkLst>
+            <pc:docMk/>
+            <pc:sldMk cId="3945898909" sldId="267"/>
+            <ac:cxnSpMk id="56" creationId="{0DB58D59-7609-5D46-AD51-AF085AD8B6F0}"/>
+          </ac:cxnSpMkLst>
+        </pc:cxnChg>
+        <pc:cxnChg chg="add mod">
+          <ac:chgData name="Ian Wu Ling En" userId="28715549-2f5c-46f8-b7f8-f39c35f3312d" providerId="ADAL" clId="{1F7A6D7A-23B7-1A44-A144-E948BBF855BF}" dt="2019-04-10T12:55:21.181" v="102" actId="1076"/>
+          <ac:cxnSpMkLst>
+            <pc:docMk/>
+            <pc:sldMk cId="3945898909" sldId="267"/>
+            <ac:cxnSpMk id="58" creationId="{01CE5758-C53B-5944-8AD7-13EE837931A2}"/>
+          </ac:cxnSpMkLst>
+        </pc:cxnChg>
+        <pc:cxnChg chg="add mod">
+          <ac:chgData name="Ian Wu Ling En" userId="28715549-2f5c-46f8-b7f8-f39c35f3312d" providerId="ADAL" clId="{1F7A6D7A-23B7-1A44-A144-E948BBF855BF}" dt="2019-04-10T12:55:37.803" v="105" actId="1076"/>
+          <ac:cxnSpMkLst>
+            <pc:docMk/>
+            <pc:sldMk cId="3945898909" sldId="267"/>
+            <ac:cxnSpMk id="66" creationId="{26D5EABF-3525-EE4B-A5B5-BE9B82AAA189}"/>
+          </ac:cxnSpMkLst>
+        </pc:cxnChg>
+        <pc:cxnChg chg="mod">
+          <ac:chgData name="Ian Wu Ling En" userId="28715549-2f5c-46f8-b7f8-f39c35f3312d" providerId="ADAL" clId="{1F7A6D7A-23B7-1A44-A144-E948BBF855BF}" dt="2019-04-10T12:54:23.093" v="62" actId="14100"/>
+          <ac:cxnSpMkLst>
+            <pc:docMk/>
+            <pc:sldMk cId="3945898909" sldId="267"/>
+            <ac:cxnSpMk id="67" creationId="{D881596E-177C-4FDC-8E60-CAB90B3D5FAB}"/>
+          </ac:cxnSpMkLst>
+        </pc:cxnChg>
+        <pc:cxnChg chg="mod">
+          <ac:chgData name="Ian Wu Ling En" userId="28715549-2f5c-46f8-b7f8-f39c35f3312d" providerId="ADAL" clId="{1F7A6D7A-23B7-1A44-A144-E948BBF855BF}" dt="2019-04-10T12:55:15.274" v="100" actId="1076"/>
+          <ac:cxnSpMkLst>
+            <pc:docMk/>
+            <pc:sldMk cId="3945898909" sldId="267"/>
+            <ac:cxnSpMk id="69" creationId="{7C9F21BC-13A9-471F-825A-2621FD36355F}"/>
+          </ac:cxnSpMkLst>
+        </pc:cxnChg>
+        <pc:cxnChg chg="mod">
+          <ac:chgData name="Ian Wu Ling En" userId="28715549-2f5c-46f8-b7f8-f39c35f3312d" providerId="ADAL" clId="{1F7A6D7A-23B7-1A44-A144-E948BBF855BF}" dt="2019-04-10T12:56:32.629" v="115" actId="14100"/>
+          <ac:cxnSpMkLst>
+            <pc:docMk/>
+            <pc:sldMk cId="3945898909" sldId="267"/>
+            <ac:cxnSpMk id="162" creationId="{65409721-EEA1-0846-8879-4EE1FADF0EFF}"/>
+          </ac:cxnSpMkLst>
+        </pc:cxnChg>
+        <pc:cxnChg chg="mod">
+          <ac:chgData name="Ian Wu Ling En" userId="28715549-2f5c-46f8-b7f8-f39c35f3312d" providerId="ADAL" clId="{1F7A6D7A-23B7-1A44-A144-E948BBF855BF}" dt="2019-04-10T12:53:08.067" v="44" actId="208"/>
+          <ac:cxnSpMkLst>
+            <pc:docMk/>
+            <pc:sldMk cId="3945898909" sldId="267"/>
+            <ac:cxnSpMk id="165" creationId="{4F0FF4FB-1D67-C84C-BFCE-0A34EDA238C7}"/>
+          </ac:cxnSpMkLst>
+        </pc:cxnChg>
+        <pc:cxnChg chg="mod">
+          <ac:chgData name="Ian Wu Ling En" userId="28715549-2f5c-46f8-b7f8-f39c35f3312d" providerId="ADAL" clId="{1F7A6D7A-23B7-1A44-A144-E948BBF855BF}" dt="2019-04-10T12:56:29.127" v="114" actId="14100"/>
+          <ac:cxnSpMkLst>
+            <pc:docMk/>
+            <pc:sldMk cId="3945898909" sldId="267"/>
+            <ac:cxnSpMk id="167" creationId="{28E231AA-2301-FB47-A587-459F1D0804BC}"/>
+          </ac:cxnSpMkLst>
+        </pc:cxnChg>
+        <pc:cxnChg chg="mod">
+          <ac:chgData name="Ian Wu Ling En" userId="28715549-2f5c-46f8-b7f8-f39c35f3312d" providerId="ADAL" clId="{1F7A6D7A-23B7-1A44-A144-E948BBF855BF}" dt="2019-04-10T12:51:17.714" v="18" actId="14100"/>
+          <ac:cxnSpMkLst>
+            <pc:docMk/>
+            <pc:sldMk cId="3945898909" sldId="267"/>
+            <ac:cxnSpMk id="171" creationId="{CCAFCC01-91DB-C943-888C-1CF2CA68C989}"/>
+          </ac:cxnSpMkLst>
+        </pc:cxnChg>
+        <pc:cxnChg chg="mod">
+          <ac:chgData name="Ian Wu Ling En" userId="28715549-2f5c-46f8-b7f8-f39c35f3312d" providerId="ADAL" clId="{1F7A6D7A-23B7-1A44-A144-E948BBF855BF}" dt="2019-04-10T12:56:32.629" v="115" actId="14100"/>
+          <ac:cxnSpMkLst>
+            <pc:docMk/>
+            <pc:sldMk cId="3945898909" sldId="267"/>
+            <ac:cxnSpMk id="173" creationId="{41431643-F130-4B45-81EA-8D5632299613}"/>
+          </ac:cxnSpMkLst>
+        </pc:cxnChg>
+        <pc:cxnChg chg="mod">
+          <ac:chgData name="Ian Wu Ling En" userId="28715549-2f5c-46f8-b7f8-f39c35f3312d" providerId="ADAL" clId="{1F7A6D7A-23B7-1A44-A144-E948BBF855BF}" dt="2019-04-10T12:52:55.472" v="42" actId="1076"/>
+          <ac:cxnSpMkLst>
+            <pc:docMk/>
+            <pc:sldMk cId="3945898909" sldId="267"/>
+            <ac:cxnSpMk id="174" creationId="{CF8D30B9-9914-6D44-91BB-5A40FB10AE4D}"/>
+          </ac:cxnSpMkLst>
+        </pc:cxnChg>
+        <pc:cxnChg chg="mod">
+          <ac:chgData name="Ian Wu Ling En" userId="28715549-2f5c-46f8-b7f8-f39c35f3312d" providerId="ADAL" clId="{1F7A6D7A-23B7-1A44-A144-E948BBF855BF}" dt="2019-04-10T12:53:22.360" v="47" actId="14100"/>
+          <ac:cxnSpMkLst>
+            <pc:docMk/>
+            <pc:sldMk cId="3945898909" sldId="267"/>
+            <ac:cxnSpMk id="175" creationId="{CCB8758D-D479-BF4D-9F67-39058ED54CFB}"/>
+          </ac:cxnSpMkLst>
+        </pc:cxnChg>
+        <pc:cxnChg chg="mod">
+          <ac:chgData name="Ian Wu Ling En" userId="28715549-2f5c-46f8-b7f8-f39c35f3312d" providerId="ADAL" clId="{1F7A6D7A-23B7-1A44-A144-E948BBF855BF}" dt="2019-04-10T12:51:44.225" v="23" actId="14100"/>
+          <ac:cxnSpMkLst>
+            <pc:docMk/>
+            <pc:sldMk cId="3945898909" sldId="267"/>
+            <ac:cxnSpMk id="178" creationId="{F6C1EC7E-93E5-764E-A9DD-882B2AC01071}"/>
+          </ac:cxnSpMkLst>
+        </pc:cxnChg>
+        <pc:cxnChg chg="mod">
+          <ac:chgData name="Ian Wu Ling En" userId="28715549-2f5c-46f8-b7f8-f39c35f3312d" providerId="ADAL" clId="{1F7A6D7A-23B7-1A44-A144-E948BBF855BF}" dt="2019-04-10T12:52:31.126" v="35" actId="208"/>
+          <ac:cxnSpMkLst>
+            <pc:docMk/>
+            <pc:sldMk cId="3945898909" sldId="267"/>
+            <ac:cxnSpMk id="181" creationId="{65C33D52-A25C-F847-8085-246F9CFB2D13}"/>
+          </ac:cxnSpMkLst>
+        </pc:cxnChg>
+        <pc:cxnChg chg="mod">
+          <ac:chgData name="Ian Wu Ling En" userId="28715549-2f5c-46f8-b7f8-f39c35f3312d" providerId="ADAL" clId="{1F7A6D7A-23B7-1A44-A144-E948BBF855BF}" dt="2019-04-10T12:52:38.086" v="37" actId="208"/>
+          <ac:cxnSpMkLst>
+            <pc:docMk/>
+            <pc:sldMk cId="3945898909" sldId="267"/>
+            <ac:cxnSpMk id="183" creationId="{D27FE0A1-4681-8745-9C89-506A378742DC}"/>
+          </ac:cxnSpMkLst>
+        </pc:cxnChg>
+        <pc:cxnChg chg="mod">
+          <ac:chgData name="Ian Wu Ling En" userId="28715549-2f5c-46f8-b7f8-f39c35f3312d" providerId="ADAL" clId="{1F7A6D7A-23B7-1A44-A144-E948BBF855BF}" dt="2019-04-10T12:58:34.283" v="119" actId="1076"/>
+          <ac:cxnSpMkLst>
+            <pc:docMk/>
+            <pc:sldMk cId="3945898909" sldId="267"/>
+            <ac:cxnSpMk id="198" creationId="{8C9BFAAE-B8E4-F846-95AA-957D0C7E8A72}"/>
+          </ac:cxnSpMkLst>
+        </pc:cxnChg>
+      </pc:sldChg>
+    </pc:docChg>
+  </pc:docChgLst>
   <pc:docChgLst>
     <pc:chgData name="Ian Wu Ling En" userId="28715549-2f5c-46f8-b7f8-f39c35f3312d" providerId="ADAL" clId="{C1F0BA41-C8CE-9742-B8A4-4E6CD10D2C20}"/>
     <pc:docChg chg="undo custSel addSld delSld modSld modMainMaster delSection modSection">
@@ -1484,276 +1828,6 @@
             <pc:docMk/>
             <pc:sldMk cId="3945898909" sldId="267"/>
             <ac:cxnSpMk id="250" creationId="{4905E054-6CE5-4BC2-AEFD-9C5C8BAA5AFA}"/>
-          </ac:cxnSpMkLst>
-        </pc:cxnChg>
-      </pc:sldChg>
-      <pc:sldChg chg="addSp modSp add del">
-        <pc:chgData name="Ian Wu Ling En" userId="28715549-2f5c-46f8-b7f8-f39c35f3312d" providerId="ADAL" clId="{C1F0BA41-C8CE-9742-B8A4-4E6CD10D2C20}" dt="2019-03-29T14:33:21.539" v="390" actId="2696"/>
-        <pc:sldMkLst>
-          <pc:docMk/>
-          <pc:sldMk cId="210566737" sldId="268"/>
-        </pc:sldMkLst>
-        <pc:spChg chg="add mod">
-          <ac:chgData name="Ian Wu Ling En" userId="28715549-2f5c-46f8-b7f8-f39c35f3312d" providerId="ADAL" clId="{C1F0BA41-C8CE-9742-B8A4-4E6CD10D2C20}" dt="2019-03-29T14:33:16.146" v="388"/>
-          <ac:spMkLst>
-            <pc:docMk/>
-            <pc:sldMk cId="210566737" sldId="268"/>
-            <ac:spMk id="2" creationId="{F69BE782-6338-564E-AEF3-99537CDA11A2}"/>
-          </ac:spMkLst>
-        </pc:spChg>
-        <pc:spChg chg="add mod">
-          <ac:chgData name="Ian Wu Ling En" userId="28715549-2f5c-46f8-b7f8-f39c35f3312d" providerId="ADAL" clId="{C1F0BA41-C8CE-9742-B8A4-4E6CD10D2C20}" dt="2019-03-29T14:33:16.146" v="388"/>
-          <ac:spMkLst>
-            <pc:docMk/>
-            <pc:sldMk cId="210566737" sldId="268"/>
-            <ac:spMk id="3" creationId="{5E1D9A0B-862D-D54D-AA82-AB557D2D45F7}"/>
-          </ac:spMkLst>
-        </pc:spChg>
-      </pc:sldChg>
-      <pc:sldChg chg="addSp delSp modSp add del">
-        <pc:chgData name="Ian Wu Ling En" userId="28715549-2f5c-46f8-b7f8-f39c35f3312d" providerId="ADAL" clId="{C1F0BA41-C8CE-9742-B8A4-4E6CD10D2C20}" dt="2019-03-29T14:33:21.560" v="391" actId="2696"/>
-        <pc:sldMkLst>
-          <pc:docMk/>
-          <pc:sldMk cId="4062680484" sldId="269"/>
-        </pc:sldMkLst>
-        <pc:spChg chg="add del">
-          <ac:chgData name="Ian Wu Ling En" userId="28715549-2f5c-46f8-b7f8-f39c35f3312d" providerId="ADAL" clId="{C1F0BA41-C8CE-9742-B8A4-4E6CD10D2C20}" dt="2019-03-29T14:27:49.389" v="259" actId="478"/>
-          <ac:spMkLst>
-            <pc:docMk/>
-            <pc:sldMk cId="4062680484" sldId="269"/>
-            <ac:spMk id="2" creationId="{D5033E6C-B300-7847-8E14-530058CD935D}"/>
-          </ac:spMkLst>
-        </pc:spChg>
-        <pc:spChg chg="add mod">
-          <ac:chgData name="Ian Wu Ling En" userId="28715549-2f5c-46f8-b7f8-f39c35f3312d" providerId="ADAL" clId="{C1F0BA41-C8CE-9742-B8A4-4E6CD10D2C20}" dt="2019-03-29T14:33:16.146" v="388"/>
-          <ac:spMkLst>
-            <pc:docMk/>
-            <pc:sldMk cId="4062680484" sldId="269"/>
-            <ac:spMk id="3" creationId="{FECB5EB6-13FF-1340-9610-DE71DAEB41B2}"/>
-          </ac:spMkLst>
-        </pc:spChg>
-        <pc:spChg chg="add mod">
-          <ac:chgData name="Ian Wu Ling En" userId="28715549-2f5c-46f8-b7f8-f39c35f3312d" providerId="ADAL" clId="{C1F0BA41-C8CE-9742-B8A4-4E6CD10D2C20}" dt="2019-03-29T14:33:16.146" v="388"/>
-          <ac:spMkLst>
-            <pc:docMk/>
-            <pc:sldMk cId="4062680484" sldId="269"/>
-            <ac:spMk id="4" creationId="{351E6675-CE84-6E4E-8B73-B5C22C86D5AE}"/>
-          </ac:spMkLst>
-        </pc:spChg>
-        <pc:spChg chg="add mod">
-          <ac:chgData name="Ian Wu Ling En" userId="28715549-2f5c-46f8-b7f8-f39c35f3312d" providerId="ADAL" clId="{C1F0BA41-C8CE-9742-B8A4-4E6CD10D2C20}" dt="2019-03-29T14:33:16.146" v="388"/>
-          <ac:spMkLst>
-            <pc:docMk/>
-            <pc:sldMk cId="4062680484" sldId="269"/>
-            <ac:spMk id="6" creationId="{D26E1777-2600-1E47-AE48-1E6419A23418}"/>
-          </ac:spMkLst>
-        </pc:spChg>
-        <pc:spChg chg="add del">
-          <ac:chgData name="Ian Wu Ling En" userId="28715549-2f5c-46f8-b7f8-f39c35f3312d" providerId="ADAL" clId="{C1F0BA41-C8CE-9742-B8A4-4E6CD10D2C20}" dt="2019-03-29T14:28:31.214" v="268" actId="478"/>
-          <ac:spMkLst>
-            <pc:docMk/>
-            <pc:sldMk cId="4062680484" sldId="269"/>
-            <ac:spMk id="9" creationId="{602AE875-4171-0141-AA24-FDCB2339C594}"/>
-          </ac:spMkLst>
-        </pc:spChg>
-        <pc:spChg chg="add mod">
-          <ac:chgData name="Ian Wu Ling En" userId="28715549-2f5c-46f8-b7f8-f39c35f3312d" providerId="ADAL" clId="{C1F0BA41-C8CE-9742-B8A4-4E6CD10D2C20}" dt="2019-03-29T14:33:16.146" v="388"/>
-          <ac:spMkLst>
-            <pc:docMk/>
-            <pc:sldMk cId="4062680484" sldId="269"/>
-            <ac:spMk id="12" creationId="{436515D3-A40B-1D48-950C-882BF4041E4F}"/>
-          </ac:spMkLst>
-        </pc:spChg>
-        <pc:spChg chg="add mod">
-          <ac:chgData name="Ian Wu Ling En" userId="28715549-2f5c-46f8-b7f8-f39c35f3312d" providerId="ADAL" clId="{C1F0BA41-C8CE-9742-B8A4-4E6CD10D2C20}" dt="2019-03-29T14:33:16.146" v="388"/>
-          <ac:spMkLst>
-            <pc:docMk/>
-            <pc:sldMk cId="4062680484" sldId="269"/>
-            <ac:spMk id="13" creationId="{030FD609-7131-644F-89D4-D2AD55F382D9}"/>
-          </ac:spMkLst>
-        </pc:spChg>
-        <pc:spChg chg="add del">
-          <ac:chgData name="Ian Wu Ling En" userId="28715549-2f5c-46f8-b7f8-f39c35f3312d" providerId="ADAL" clId="{C1F0BA41-C8CE-9742-B8A4-4E6CD10D2C20}" dt="2019-03-29T14:28:33.591" v="271" actId="478"/>
-          <ac:spMkLst>
-            <pc:docMk/>
-            <pc:sldMk cId="4062680484" sldId="269"/>
-            <ac:spMk id="14" creationId="{CCEBA0E8-FF8C-3347-8CC0-A8738539C9DE}"/>
-          </ac:spMkLst>
-        </pc:spChg>
-        <pc:spChg chg="add del">
-          <ac:chgData name="Ian Wu Ling En" userId="28715549-2f5c-46f8-b7f8-f39c35f3312d" providerId="ADAL" clId="{C1F0BA41-C8CE-9742-B8A4-4E6CD10D2C20}" dt="2019-03-29T14:29:34.920" v="316" actId="478"/>
-          <ac:spMkLst>
-            <pc:docMk/>
-            <pc:sldMk cId="4062680484" sldId="269"/>
-            <ac:spMk id="17" creationId="{EB067A36-4898-E04E-A0A1-EF3AC93A3573}"/>
-          </ac:spMkLst>
-        </pc:spChg>
-        <pc:spChg chg="add mod">
-          <ac:chgData name="Ian Wu Ling En" userId="28715549-2f5c-46f8-b7f8-f39c35f3312d" providerId="ADAL" clId="{C1F0BA41-C8CE-9742-B8A4-4E6CD10D2C20}" dt="2019-03-29T14:33:16.146" v="388"/>
-          <ac:spMkLst>
-            <pc:docMk/>
-            <pc:sldMk cId="4062680484" sldId="269"/>
-            <ac:spMk id="18" creationId="{40DCD678-9C1F-774A-9ECB-CC5BE1B3CBE2}"/>
-          </ac:spMkLst>
-        </pc:spChg>
-        <pc:spChg chg="add del">
-          <ac:chgData name="Ian Wu Ling En" userId="28715549-2f5c-46f8-b7f8-f39c35f3312d" providerId="ADAL" clId="{C1F0BA41-C8CE-9742-B8A4-4E6CD10D2C20}" dt="2019-03-29T14:30:32.213" v="344" actId="478"/>
-          <ac:spMkLst>
-            <pc:docMk/>
-            <pc:sldMk cId="4062680484" sldId="269"/>
-            <ac:spMk id="20" creationId="{FC127C06-21D0-A141-8D17-E8EAB76F8475}"/>
-          </ac:spMkLst>
-        </pc:spChg>
-        <pc:spChg chg="add mod">
-          <ac:chgData name="Ian Wu Ling En" userId="28715549-2f5c-46f8-b7f8-f39c35f3312d" providerId="ADAL" clId="{C1F0BA41-C8CE-9742-B8A4-4E6CD10D2C20}" dt="2019-03-29T14:33:16.146" v="388"/>
-          <ac:spMkLst>
-            <pc:docMk/>
-            <pc:sldMk cId="4062680484" sldId="269"/>
-            <ac:spMk id="24" creationId="{D1407A9C-68E1-AD4E-B457-BC5DC0E6BCDE}"/>
-          </ac:spMkLst>
-        </pc:spChg>
-        <pc:spChg chg="add mod">
-          <ac:chgData name="Ian Wu Ling En" userId="28715549-2f5c-46f8-b7f8-f39c35f3312d" providerId="ADAL" clId="{C1F0BA41-C8CE-9742-B8A4-4E6CD10D2C20}" dt="2019-03-29T14:33:16.146" v="388"/>
-          <ac:spMkLst>
-            <pc:docMk/>
-            <pc:sldMk cId="4062680484" sldId="269"/>
-            <ac:spMk id="26" creationId="{E715B8D7-445C-2C49-9B00-E7B71BC9A91A}"/>
-          </ac:spMkLst>
-        </pc:spChg>
-        <pc:spChg chg="add mod">
-          <ac:chgData name="Ian Wu Ling En" userId="28715549-2f5c-46f8-b7f8-f39c35f3312d" providerId="ADAL" clId="{C1F0BA41-C8CE-9742-B8A4-4E6CD10D2C20}" dt="2019-03-29T14:33:16.146" v="388"/>
-          <ac:spMkLst>
-            <pc:docMk/>
-            <pc:sldMk cId="4062680484" sldId="269"/>
-            <ac:spMk id="28" creationId="{7EE84BF0-665B-9C44-B21D-31E1E5472C07}"/>
-          </ac:spMkLst>
-        </pc:spChg>
-        <pc:spChg chg="add mod">
-          <ac:chgData name="Ian Wu Ling En" userId="28715549-2f5c-46f8-b7f8-f39c35f3312d" providerId="ADAL" clId="{C1F0BA41-C8CE-9742-B8A4-4E6CD10D2C20}" dt="2019-03-29T14:33:16.146" v="388"/>
-          <ac:spMkLst>
-            <pc:docMk/>
-            <pc:sldMk cId="4062680484" sldId="269"/>
-            <ac:spMk id="29" creationId="{798DEFB5-65EF-794A-8FA5-248CFE162705}"/>
-          </ac:spMkLst>
-        </pc:spChg>
-        <pc:spChg chg="add mod">
-          <ac:chgData name="Ian Wu Ling En" userId="28715549-2f5c-46f8-b7f8-f39c35f3312d" providerId="ADAL" clId="{C1F0BA41-C8CE-9742-B8A4-4E6CD10D2C20}" dt="2019-03-29T14:33:16.146" v="388"/>
-          <ac:spMkLst>
-            <pc:docMk/>
-            <pc:sldMk cId="4062680484" sldId="269"/>
-            <ac:spMk id="31" creationId="{788C5E26-5FB6-1A4D-B343-DEDC39943763}"/>
-          </ac:spMkLst>
-        </pc:spChg>
-        <pc:cxnChg chg="add mod">
-          <ac:chgData name="Ian Wu Ling En" userId="28715549-2f5c-46f8-b7f8-f39c35f3312d" providerId="ADAL" clId="{C1F0BA41-C8CE-9742-B8A4-4E6CD10D2C20}" dt="2019-03-29T14:33:16.146" v="388"/>
-          <ac:cxnSpMkLst>
-            <pc:docMk/>
-            <pc:sldMk cId="4062680484" sldId="269"/>
-            <ac:cxnSpMk id="5" creationId="{0E0AEE34-8C21-A34C-A493-0B18AC3F5EA2}"/>
-          </ac:cxnSpMkLst>
-        </pc:cxnChg>
-        <pc:cxnChg chg="add mod">
-          <ac:chgData name="Ian Wu Ling En" userId="28715549-2f5c-46f8-b7f8-f39c35f3312d" providerId="ADAL" clId="{C1F0BA41-C8CE-9742-B8A4-4E6CD10D2C20}" dt="2019-03-29T14:33:16.146" v="388"/>
-          <ac:cxnSpMkLst>
-            <pc:docMk/>
-            <pc:sldMk cId="4062680484" sldId="269"/>
-            <ac:cxnSpMk id="7" creationId="{8B238619-3D85-FA48-8534-3A72D4542FA6}"/>
-          </ac:cxnSpMkLst>
-        </pc:cxnChg>
-        <pc:cxnChg chg="add mod">
-          <ac:chgData name="Ian Wu Ling En" userId="28715549-2f5c-46f8-b7f8-f39c35f3312d" providerId="ADAL" clId="{C1F0BA41-C8CE-9742-B8A4-4E6CD10D2C20}" dt="2019-03-29T14:33:16.146" v="388"/>
-          <ac:cxnSpMkLst>
-            <pc:docMk/>
-            <pc:sldMk cId="4062680484" sldId="269"/>
-            <ac:cxnSpMk id="8" creationId="{5CA53627-E6BD-4D49-A557-2F80A8305ACC}"/>
-          </ac:cxnSpMkLst>
-        </pc:cxnChg>
-        <pc:cxnChg chg="add del">
-          <ac:chgData name="Ian Wu Ling En" userId="28715549-2f5c-46f8-b7f8-f39c35f3312d" providerId="ADAL" clId="{C1F0BA41-C8CE-9742-B8A4-4E6CD10D2C20}" dt="2019-03-29T14:28:32.046" v="269" actId="478"/>
-          <ac:cxnSpMkLst>
-            <pc:docMk/>
-            <pc:sldMk cId="4062680484" sldId="269"/>
-            <ac:cxnSpMk id="10" creationId="{A2C47FC6-042C-DF43-9BF1-6F405C663FA9}"/>
-          </ac:cxnSpMkLst>
-        </pc:cxnChg>
-        <pc:cxnChg chg="add mod">
-          <ac:chgData name="Ian Wu Ling En" userId="28715549-2f5c-46f8-b7f8-f39c35f3312d" providerId="ADAL" clId="{C1F0BA41-C8CE-9742-B8A4-4E6CD10D2C20}" dt="2019-03-29T14:33:16.146" v="388"/>
-          <ac:cxnSpMkLst>
-            <pc:docMk/>
-            <pc:sldMk cId="4062680484" sldId="269"/>
-            <ac:cxnSpMk id="11" creationId="{C7ACF7B8-C052-1647-B11F-6D48FE0C4A29}"/>
-          </ac:cxnSpMkLst>
-        </pc:cxnChg>
-        <pc:cxnChg chg="add mod">
-          <ac:chgData name="Ian Wu Ling En" userId="28715549-2f5c-46f8-b7f8-f39c35f3312d" providerId="ADAL" clId="{C1F0BA41-C8CE-9742-B8A4-4E6CD10D2C20}" dt="2019-03-29T14:33:16.146" v="388"/>
-          <ac:cxnSpMkLst>
-            <pc:docMk/>
-            <pc:sldMk cId="4062680484" sldId="269"/>
-            <ac:cxnSpMk id="15" creationId="{29AFE14A-6983-DC49-AC39-101A8E22479B}"/>
-          </ac:cxnSpMkLst>
-        </pc:cxnChg>
-        <pc:cxnChg chg="add del">
-          <ac:chgData name="Ian Wu Ling En" userId="28715549-2f5c-46f8-b7f8-f39c35f3312d" providerId="ADAL" clId="{C1F0BA41-C8CE-9742-B8A4-4E6CD10D2C20}" dt="2019-03-29T14:28:32.989" v="270" actId="478"/>
-          <ac:cxnSpMkLst>
-            <pc:docMk/>
-            <pc:sldMk cId="4062680484" sldId="269"/>
-            <ac:cxnSpMk id="16" creationId="{3159B3AC-923D-894C-A730-6660575580C3}"/>
-          </ac:cxnSpMkLst>
-        </pc:cxnChg>
-        <pc:cxnChg chg="add mod">
-          <ac:chgData name="Ian Wu Ling En" userId="28715549-2f5c-46f8-b7f8-f39c35f3312d" providerId="ADAL" clId="{C1F0BA41-C8CE-9742-B8A4-4E6CD10D2C20}" dt="2019-03-29T14:33:16.146" v="388"/>
-          <ac:cxnSpMkLst>
-            <pc:docMk/>
-            <pc:sldMk cId="4062680484" sldId="269"/>
-            <ac:cxnSpMk id="19" creationId="{33CF58DB-E64B-8049-ABA4-A02743EA7E6C}"/>
-          </ac:cxnSpMkLst>
-        </pc:cxnChg>
-        <pc:cxnChg chg="add mod">
-          <ac:chgData name="Ian Wu Ling En" userId="28715549-2f5c-46f8-b7f8-f39c35f3312d" providerId="ADAL" clId="{C1F0BA41-C8CE-9742-B8A4-4E6CD10D2C20}" dt="2019-03-29T14:33:16.146" v="388"/>
-          <ac:cxnSpMkLst>
-            <pc:docMk/>
-            <pc:sldMk cId="4062680484" sldId="269"/>
-            <ac:cxnSpMk id="21" creationId="{C601EDE0-BC7F-EA46-B646-FA83B4C1104D}"/>
-          </ac:cxnSpMkLst>
-        </pc:cxnChg>
-        <pc:cxnChg chg="add mod">
-          <ac:chgData name="Ian Wu Ling En" userId="28715549-2f5c-46f8-b7f8-f39c35f3312d" providerId="ADAL" clId="{C1F0BA41-C8CE-9742-B8A4-4E6CD10D2C20}" dt="2019-03-29T14:33:16.146" v="388"/>
-          <ac:cxnSpMkLst>
-            <pc:docMk/>
-            <pc:sldMk cId="4062680484" sldId="269"/>
-            <ac:cxnSpMk id="22" creationId="{3755940A-FF55-274B-8028-507B3064C085}"/>
-          </ac:cxnSpMkLst>
-        </pc:cxnChg>
-        <pc:cxnChg chg="add del">
-          <ac:chgData name="Ian Wu Ling En" userId="28715549-2f5c-46f8-b7f8-f39c35f3312d" providerId="ADAL" clId="{C1F0BA41-C8CE-9742-B8A4-4E6CD10D2C20}" dt="2019-03-29T14:30:33.022" v="345" actId="478"/>
-          <ac:cxnSpMkLst>
-            <pc:docMk/>
-            <pc:sldMk cId="4062680484" sldId="269"/>
-            <ac:cxnSpMk id="23" creationId="{578284C2-174D-DC42-8D62-14EE60E1C94C}"/>
-          </ac:cxnSpMkLst>
-        </pc:cxnChg>
-        <pc:cxnChg chg="add mod">
-          <ac:chgData name="Ian Wu Ling En" userId="28715549-2f5c-46f8-b7f8-f39c35f3312d" providerId="ADAL" clId="{C1F0BA41-C8CE-9742-B8A4-4E6CD10D2C20}" dt="2019-03-29T14:33:16.146" v="388"/>
-          <ac:cxnSpMkLst>
-            <pc:docMk/>
-            <pc:sldMk cId="4062680484" sldId="269"/>
-            <ac:cxnSpMk id="27" creationId="{5B829BCD-8CCD-DA4B-9145-87C704D1A141}"/>
-          </ac:cxnSpMkLst>
-        </pc:cxnChg>
-        <pc:cxnChg chg="add mod">
-          <ac:chgData name="Ian Wu Ling En" userId="28715549-2f5c-46f8-b7f8-f39c35f3312d" providerId="ADAL" clId="{C1F0BA41-C8CE-9742-B8A4-4E6CD10D2C20}" dt="2019-03-29T14:33:16.146" v="388"/>
-          <ac:cxnSpMkLst>
-            <pc:docMk/>
-            <pc:sldMk cId="4062680484" sldId="269"/>
-            <ac:cxnSpMk id="30" creationId="{FF2CC5B6-DE02-1A45-8334-F867AD695DAD}"/>
-          </ac:cxnSpMkLst>
-        </pc:cxnChg>
-        <pc:cxnChg chg="add mod">
-          <ac:chgData name="Ian Wu Ling En" userId="28715549-2f5c-46f8-b7f8-f39c35f3312d" providerId="ADAL" clId="{C1F0BA41-C8CE-9742-B8A4-4E6CD10D2C20}" dt="2019-03-29T14:33:16.146" v="388"/>
-          <ac:cxnSpMkLst>
-            <pc:docMk/>
-            <pc:sldMk cId="4062680484" sldId="269"/>
-            <ac:cxnSpMk id="32" creationId="{B938A987-6BAC-C044-9972-6729125824A3}"/>
           </ac:cxnSpMkLst>
         </pc:cxnChg>
       </pc:sldChg>
@@ -2109,7 +2183,7 @@
           <a:p>
             <a:fld id="{F5CC4B3F-88C1-4FFA-B1B6-F41C21DC6924}" type="datetimeFigureOut">
               <a:rPr lang="en-US" smtClean="0"/>
-              <a:t>3/29/19</a:t>
+              <a:t>4/10/19</a:t>
             </a:fld>
             <a:endParaRPr lang="en-US"/>
           </a:p>
@@ -2555,7 +2629,7 @@
           <a:p>
             <a:fld id="{78C97017-6FC3-485B-9764-EAC9E56C1D49}" type="datetimeFigureOut">
               <a:rPr lang="en-US" smtClean="0"/>
-              <a:t>3/29/19</a:t>
+              <a:t>4/10/19</a:t>
             </a:fld>
             <a:endParaRPr lang="en-US"/>
           </a:p>
@@ -2723,7 +2797,7 @@
           <a:p>
             <a:fld id="{78C97017-6FC3-485B-9764-EAC9E56C1D49}" type="datetimeFigureOut">
               <a:rPr lang="en-US" smtClean="0"/>
-              <a:t>3/29/19</a:t>
+              <a:t>4/10/19</a:t>
             </a:fld>
             <a:endParaRPr lang="en-US"/>
           </a:p>
@@ -2901,7 +2975,7 @@
           <a:p>
             <a:fld id="{78C97017-6FC3-485B-9764-EAC9E56C1D49}" type="datetimeFigureOut">
               <a:rPr lang="en-US" smtClean="0"/>
-              <a:t>3/29/19</a:t>
+              <a:t>4/10/19</a:t>
             </a:fld>
             <a:endParaRPr lang="en-US"/>
           </a:p>
@@ -3069,7 +3143,7 @@
           <a:p>
             <a:fld id="{78C97017-6FC3-485B-9764-EAC9E56C1D49}" type="datetimeFigureOut">
               <a:rPr lang="en-US" smtClean="0"/>
-              <a:t>3/29/19</a:t>
+              <a:t>4/10/19</a:t>
             </a:fld>
             <a:endParaRPr lang="en-US"/>
           </a:p>
@@ -3314,7 +3388,7 @@
           <a:p>
             <a:fld id="{78C97017-6FC3-485B-9764-EAC9E56C1D49}" type="datetimeFigureOut">
               <a:rPr lang="en-US" smtClean="0"/>
-              <a:t>3/29/19</a:t>
+              <a:t>4/10/19</a:t>
             </a:fld>
             <a:endParaRPr lang="en-US"/>
           </a:p>
@@ -3599,7 +3673,7 @@
           <a:p>
             <a:fld id="{78C97017-6FC3-485B-9764-EAC9E56C1D49}" type="datetimeFigureOut">
               <a:rPr lang="en-US" smtClean="0"/>
-              <a:t>3/29/19</a:t>
+              <a:t>4/10/19</a:t>
             </a:fld>
             <a:endParaRPr lang="en-US"/>
           </a:p>
@@ -4018,7 +4092,7 @@
           <a:p>
             <a:fld id="{78C97017-6FC3-485B-9764-EAC9E56C1D49}" type="datetimeFigureOut">
               <a:rPr lang="en-US" smtClean="0"/>
-              <a:t>3/29/19</a:t>
+              <a:t>4/10/19</a:t>
             </a:fld>
             <a:endParaRPr lang="en-US"/>
           </a:p>
@@ -4135,7 +4209,7 @@
           <a:p>
             <a:fld id="{78C97017-6FC3-485B-9764-EAC9E56C1D49}" type="datetimeFigureOut">
               <a:rPr lang="en-US" smtClean="0"/>
-              <a:t>3/29/19</a:t>
+              <a:t>4/10/19</a:t>
             </a:fld>
             <a:endParaRPr lang="en-US"/>
           </a:p>
@@ -4230,7 +4304,7 @@
           <a:p>
             <a:fld id="{78C97017-6FC3-485B-9764-EAC9E56C1D49}" type="datetimeFigureOut">
               <a:rPr lang="en-US" smtClean="0"/>
-              <a:t>3/29/19</a:t>
+              <a:t>4/10/19</a:t>
             </a:fld>
             <a:endParaRPr lang="en-US"/>
           </a:p>
@@ -4505,7 +4579,7 @@
           <a:p>
             <a:fld id="{78C97017-6FC3-485B-9764-EAC9E56C1D49}" type="datetimeFigureOut">
               <a:rPr lang="en-US" smtClean="0"/>
-              <a:t>3/29/19</a:t>
+              <a:t>4/10/19</a:t>
             </a:fld>
             <a:endParaRPr lang="en-US"/>
           </a:p>
@@ -4757,7 +4831,7 @@
           <a:p>
             <a:fld id="{78C97017-6FC3-485B-9764-EAC9E56C1D49}" type="datetimeFigureOut">
               <a:rPr lang="en-US" smtClean="0"/>
-              <a:t>3/29/19</a:t>
+              <a:t>4/10/19</a:t>
             </a:fld>
             <a:endParaRPr lang="en-US"/>
           </a:p>
@@ -4968,7 +5042,7 @@
           <a:p>
             <a:fld id="{78C97017-6FC3-485B-9764-EAC9E56C1D49}" type="datetimeFigureOut">
               <a:rPr lang="en-US" smtClean="0"/>
-              <a:t>3/29/19</a:t>
+              <a:t>4/10/19</a:t>
             </a:fld>
             <a:endParaRPr lang="en-US"/>
           </a:p>
@@ -5357,8 +5431,8 @@
         </p:nvSpPr>
         <p:spPr>
           <a:xfrm>
-            <a:off x="210344" y="279247"/>
-            <a:ext cx="8136550" cy="5965241"/>
+            <a:off x="210344" y="254533"/>
+            <a:ext cx="8043970" cy="5965241"/>
           </a:xfrm>
           <a:prstGeom prst="roundRect">
             <a:avLst>
@@ -5424,8 +5498,8 @@
         </p:nvSpPr>
         <p:spPr>
           <a:xfrm>
-            <a:off x="8405102" y="279248"/>
-            <a:ext cx="4987843" cy="5965241"/>
+            <a:off x="8353168" y="279248"/>
+            <a:ext cx="5039777" cy="5965241"/>
           </a:xfrm>
           <a:prstGeom prst="roundRect">
             <a:avLst>
@@ -5568,14 +5642,14 @@
           <a:p>
             <a:pPr algn="ctr"/>
             <a:r>
-              <a:rPr lang="en-US" sz="1600" dirty="0">
+              <a:rPr lang="en-US" sz="1400" dirty="0">
                 <a:solidFill>
                   <a:schemeClr val="bg1"/>
                 </a:solidFill>
               </a:rPr>
               <a:t>:LogicManager</a:t>
             </a:r>
-            <a:endParaRPr lang="en-SG" sz="1600" dirty="0">
+            <a:endParaRPr lang="en-SG" sz="1400" dirty="0">
               <a:solidFill>
                 <a:schemeClr val="bg1"/>
               </a:solidFill>
@@ -5713,7 +5787,7 @@
           <a:p>
             <a:pPr algn="ctr"/>
             <a:r>
-              <a:rPr lang="en-US" sz="1600" dirty="0">
+              <a:rPr lang="en-US" sz="1400" dirty="0">
                 <a:solidFill>
                   <a:schemeClr val="bg1"/>
                 </a:solidFill>
@@ -5724,14 +5798,14 @@
           <a:p>
             <a:pPr algn="ctr"/>
             <a:r>
-              <a:rPr lang="en-US" sz="1600" dirty="0">
+              <a:rPr lang="en-US" sz="1400" dirty="0">
                 <a:solidFill>
                   <a:schemeClr val="bg1"/>
                 </a:solidFill>
               </a:rPr>
               <a:t>BookParser</a:t>
             </a:r>
-            <a:endParaRPr lang="en-SG" sz="1600" dirty="0">
+            <a:endParaRPr lang="en-SG" sz="1400" dirty="0">
               <a:solidFill>
                 <a:schemeClr val="bg1"/>
               </a:solidFill>
@@ -5750,7 +5824,7 @@
         <p:spPr>
           <a:xfrm>
             <a:off x="4163805" y="1042867"/>
-            <a:ext cx="0" cy="2160660"/>
+            <a:ext cx="0" cy="2800084"/>
           </a:xfrm>
           <a:prstGeom prst="line">
             <a:avLst/>
@@ -5786,8 +5860,8 @@
         </p:nvSpPr>
         <p:spPr>
           <a:xfrm>
-            <a:off x="4091800" y="1501066"/>
-            <a:ext cx="154408" cy="1434579"/>
+            <a:off x="4071486" y="1453416"/>
+            <a:ext cx="174722" cy="2030930"/>
           </a:xfrm>
           <a:prstGeom prst="rect">
             <a:avLst/>
@@ -5835,8 +5909,8 @@
         </p:nvCxnSpPr>
         <p:spPr>
           <a:xfrm>
-            <a:off x="532333" y="1397245"/>
-            <a:ext cx="1119851" cy="0"/>
+            <a:off x="286544" y="1397245"/>
+            <a:ext cx="1365640" cy="0"/>
           </a:xfrm>
           <a:prstGeom prst="straightConnector1">
             <a:avLst/>
@@ -5961,8 +6035,8 @@
         </p:nvCxnSpPr>
         <p:spPr>
           <a:xfrm>
-            <a:off x="1821470" y="2922095"/>
-            <a:ext cx="2270334" cy="0"/>
+            <a:off x="1792014" y="3480361"/>
+            <a:ext cx="2299790" cy="0"/>
           </a:xfrm>
           <a:prstGeom prst="straightConnector1">
             <a:avLst/>
@@ -6099,8 +6173,8 @@
         </p:nvCxnSpPr>
         <p:spPr>
           <a:xfrm>
-            <a:off x="1821468" y="1499178"/>
-            <a:ext cx="2256706" cy="1"/>
+            <a:off x="1780674" y="1499179"/>
+            <a:ext cx="2297500" cy="0"/>
           </a:xfrm>
           <a:prstGeom prst="straightConnector1">
             <a:avLst/>
@@ -6145,7 +6219,7 @@
         <p:spPr>
           <a:xfrm flipV="1">
             <a:off x="1804573" y="5669706"/>
-            <a:ext cx="4506152" cy="342"/>
+            <a:ext cx="4506154" cy="342"/>
           </a:xfrm>
           <a:prstGeom prst="straightConnector1">
             <a:avLst/>
@@ -6174,53 +6248,6 @@
           </a:fontRef>
         </p:style>
       </p:cxnSp>
-      <p:sp>
-        <p:nvSpPr>
-          <p:cNvPr id="65" name="Rectangle 64"/>
-          <p:cNvSpPr/>
-          <p:nvPr/>
-        </p:nvSpPr>
-        <p:spPr>
-          <a:xfrm>
-            <a:off x="6234526" y="2190574"/>
-            <a:ext cx="152401" cy="3479132"/>
-          </a:xfrm>
-          <a:prstGeom prst="rect">
-            <a:avLst/>
-          </a:prstGeom>
-          <a:solidFill>
-            <a:srgbClr val="0070C0"/>
-          </a:solidFill>
-          <a:ln>
-            <a:solidFill>
-              <a:srgbClr val="0070C0"/>
-            </a:solidFill>
-          </a:ln>
-          <a:effectLst/>
-        </p:spPr>
-        <p:style>
-          <a:lnRef idx="1">
-            <a:schemeClr val="accent3"/>
-          </a:lnRef>
-          <a:fillRef idx="2">
-            <a:schemeClr val="accent3"/>
-          </a:fillRef>
-          <a:effectRef idx="1">
-            <a:schemeClr val="accent3"/>
-          </a:effectRef>
-          <a:fontRef idx="minor">
-            <a:schemeClr val="dk1"/>
-          </a:fontRef>
-        </p:style>
-        <p:txBody>
-          <a:bodyPr rtlCol="0" anchor="ctr"/>
-          <a:lstStyle/>
-          <a:p>
-            <a:pPr algn="ctr"/>
-            <a:endParaRPr lang="en-SG" sz="1400"/>
-          </a:p>
-        </p:txBody>
-      </p:sp>
       <p:sp>
         <p:nvSpPr>
           <p:cNvPr id="78" name="Rectangle 77">
@@ -6324,7 +6351,7 @@
           <a:p>
             <a:pPr algn="ctr"/>
             <a:r>
-              <a:rPr lang="en-US" sz="1600" dirty="0">
+              <a:rPr lang="en-US" sz="1400" dirty="0">
                 <a:solidFill>
                   <a:schemeClr val="bg1"/>
                 </a:solidFill>
@@ -6335,14 +6362,14 @@
           <a:p>
             <a:pPr algn="ctr"/>
             <a:r>
-              <a:rPr lang="en-US" sz="1600" dirty="0">
+              <a:rPr lang="en-US" sz="1400" dirty="0">
                 <a:solidFill>
                   <a:schemeClr val="bg1"/>
                 </a:solidFill>
               </a:rPr>
               <a:t>Command</a:t>
             </a:r>
-            <a:endParaRPr lang="en-SG" sz="1600" dirty="0">
+            <a:endParaRPr lang="en-SG" sz="1400" dirty="0">
               <a:solidFill>
                 <a:schemeClr val="bg1"/>
               </a:solidFill>
@@ -6403,7 +6430,7 @@
         </p:nvSpPr>
         <p:spPr>
           <a:xfrm>
-            <a:off x="3162809" y="1339620"/>
+            <a:off x="3797123" y="1339620"/>
             <a:ext cx="2082984" cy="215444"/>
           </a:xfrm>
           <a:prstGeom prst="rect">
@@ -6428,63 +6455,11 @@
             </a:lvl1pPr>
           </a:lstStyle>
           <a:p>
+            <a:pPr algn="ctr"/>
             <a:r>
               <a:rPr lang="en-US" dirty="0"/>
               <a:t>execute()</a:t>
             </a:r>
-          </a:p>
-        </p:txBody>
-      </p:sp>
-      <p:sp>
-        <p:nvSpPr>
-          <p:cNvPr id="160" name="Rectangle 159">
-            <a:extLst>
-              <a:ext uri="{FF2B5EF4-FFF2-40B4-BE49-F238E27FC236}">
-                <a16:creationId xmlns:a16="http://schemas.microsoft.com/office/drawing/2014/main" id="{BB7E46E7-A8BC-804A-81B1-D7AB1D98FE3E}"/>
-              </a:ext>
-            </a:extLst>
-          </p:cNvPr>
-          <p:cNvSpPr/>
-          <p:nvPr/>
-        </p:nvSpPr>
-        <p:spPr>
-          <a:xfrm>
-            <a:off x="10434287" y="2520602"/>
-            <a:ext cx="168894" cy="755491"/>
-          </a:xfrm>
-          <a:prstGeom prst="rect">
-            <a:avLst/>
-          </a:prstGeom>
-          <a:solidFill>
-            <a:srgbClr val="7030A0"/>
-          </a:solidFill>
-          <a:ln>
-            <a:solidFill>
-              <a:srgbClr val="7030A0"/>
-            </a:solidFill>
-          </a:ln>
-          <a:effectLst/>
-        </p:spPr>
-        <p:style>
-          <a:lnRef idx="1">
-            <a:schemeClr val="accent3"/>
-          </a:lnRef>
-          <a:fillRef idx="2">
-            <a:schemeClr val="accent3"/>
-          </a:fillRef>
-          <a:effectRef idx="1">
-            <a:schemeClr val="accent3"/>
-          </a:effectRef>
-          <a:fontRef idx="minor">
-            <a:schemeClr val="dk1"/>
-          </a:fontRef>
-        </p:style>
-        <p:txBody>
-          <a:bodyPr rtlCol="0" anchor="ctr"/>
-          <a:lstStyle/>
-          <a:p>
-            <a:pPr algn="ctr"/>
-            <a:endParaRPr lang="en-SG" sz="1400"/>
           </a:p>
         </p:txBody>
       </p:sp>
@@ -6502,8 +6477,8 @@
         </p:nvSpPr>
         <p:spPr>
           <a:xfrm>
-            <a:off x="8455897" y="1530963"/>
-            <a:ext cx="841636" cy="300181"/>
+            <a:off x="8489091" y="1530963"/>
+            <a:ext cx="808441" cy="300181"/>
           </a:xfrm>
           <a:prstGeom prst="rect">
             <a:avLst/>
@@ -6538,14 +6513,14 @@
           <a:p>
             <a:pPr algn="ctr"/>
             <a:r>
-              <a:rPr lang="en-US" sz="1600" dirty="0">
+              <a:rPr lang="en-US" sz="1400">
                 <a:solidFill>
                   <a:schemeClr val="bg1"/>
                 </a:solidFill>
               </a:rPr>
-              <a:t>: Model</a:t>
-            </a:r>
-            <a:endParaRPr lang="en-SG" sz="1600" dirty="0">
+              <a:t>:Model</a:t>
+            </a:r>
+            <a:endParaRPr lang="en-SG" sz="1400" dirty="0">
               <a:solidFill>
                 <a:schemeClr val="bg1"/>
               </a:solidFill>
@@ -6568,9 +6543,9 @@
           <p:nvPr/>
         </p:nvCxnSpPr>
         <p:spPr>
-          <a:xfrm flipH="1">
-            <a:off x="8896597" y="1822070"/>
-            <a:ext cx="1" cy="3371739"/>
+          <a:xfrm>
+            <a:off x="8896599" y="1822070"/>
+            <a:ext cx="0" cy="4405735"/>
           </a:xfrm>
           <a:prstGeom prst="line">
             <a:avLst/>
@@ -6667,15 +6642,15 @@
         </p:nvCxnSpPr>
         <p:spPr>
           <a:xfrm>
-            <a:off x="6391014" y="2414526"/>
-            <a:ext cx="2425738" cy="1"/>
+            <a:off x="6302559" y="2414527"/>
+            <a:ext cx="2514193" cy="0"/>
           </a:xfrm>
           <a:prstGeom prst="straightConnector1">
             <a:avLst/>
           </a:prstGeom>
           <a:ln w="19050">
             <a:solidFill>
-              <a:srgbClr val="0070C0"/>
+              <a:srgbClr val="7030A0"/>
             </a:solidFill>
             <a:tailEnd type="arrow"/>
           </a:ln>
@@ -6712,15 +6687,15 @@
         </p:nvCxnSpPr>
         <p:spPr>
           <a:xfrm>
-            <a:off x="10494176" y="2052786"/>
-            <a:ext cx="0" cy="3097120"/>
+            <a:off x="10494176" y="2052788"/>
+            <a:ext cx="0" cy="4187374"/>
           </a:xfrm>
           <a:prstGeom prst="line">
             <a:avLst/>
           </a:prstGeom>
           <a:ln w="19050">
             <a:solidFill>
-              <a:srgbClr val="7030A0"/>
+              <a:srgbClr val="59595A"/>
             </a:solidFill>
             <a:prstDash val="sysDash"/>
           </a:ln>
@@ -6801,7 +6776,7 @@
         </p:nvSpPr>
         <p:spPr>
           <a:xfrm>
-            <a:off x="9148685" y="2358134"/>
+            <a:off x="9069962" y="2291522"/>
             <a:ext cx="1292661" cy="184666"/>
           </a:xfrm>
           <a:prstGeom prst="rect">
@@ -6871,8 +6846,8 @@
         </p:nvCxnSpPr>
         <p:spPr>
           <a:xfrm>
-            <a:off x="8979210" y="2536666"/>
-            <a:ext cx="1455079" cy="0"/>
+            <a:off x="8950220" y="2518499"/>
+            <a:ext cx="1490125" cy="0"/>
           </a:xfrm>
           <a:prstGeom prst="straightConnector1">
             <a:avLst/>
@@ -6899,59 +6874,6 @@
           </a:fontRef>
         </p:style>
       </p:cxnSp>
-      <p:sp>
-        <p:nvSpPr>
-          <p:cNvPr id="172" name="Rectangle 171">
-            <a:extLst>
-              <a:ext uri="{FF2B5EF4-FFF2-40B4-BE49-F238E27FC236}">
-                <a16:creationId xmlns:a16="http://schemas.microsoft.com/office/drawing/2014/main" id="{7AE6C50E-906C-2C47-A0B7-0D79836B876A}"/>
-              </a:ext>
-            </a:extLst>
-          </p:cNvPr>
-          <p:cNvSpPr/>
-          <p:nvPr/>
-        </p:nvSpPr>
-        <p:spPr>
-          <a:xfrm>
-            <a:off x="12039316" y="2492734"/>
-            <a:ext cx="129934" cy="561275"/>
-          </a:xfrm>
-          <a:prstGeom prst="rect">
-            <a:avLst/>
-          </a:prstGeom>
-          <a:solidFill>
-            <a:srgbClr val="7030A0"/>
-          </a:solidFill>
-          <a:ln>
-            <a:solidFill>
-              <a:srgbClr val="7030A0"/>
-            </a:solidFill>
-          </a:ln>
-          <a:effectLst/>
-        </p:spPr>
-        <p:style>
-          <a:lnRef idx="1">
-            <a:schemeClr val="accent3"/>
-          </a:lnRef>
-          <a:fillRef idx="2">
-            <a:schemeClr val="accent3"/>
-          </a:fillRef>
-          <a:effectRef idx="1">
-            <a:schemeClr val="accent3"/>
-          </a:effectRef>
-          <a:fontRef idx="minor">
-            <a:schemeClr val="dk1"/>
-          </a:fontRef>
-        </p:style>
-        <p:txBody>
-          <a:bodyPr rtlCol="0" anchor="ctr"/>
-          <a:lstStyle/>
-          <a:p>
-            <a:pPr algn="ctr"/>
-            <a:endParaRPr lang="en-SG" sz="1400"/>
-          </a:p>
-        </p:txBody>
-      </p:sp>
       <p:cxnSp>
         <p:nvCxnSpPr>
           <p:cNvPr id="173" name="Straight Connector 172">
@@ -6969,14 +6891,14 @@
         <p:spPr>
           <a:xfrm>
             <a:off x="12121847" y="2196115"/>
-            <a:ext cx="0" cy="2953793"/>
+            <a:ext cx="0" cy="4044047"/>
           </a:xfrm>
           <a:prstGeom prst="line">
             <a:avLst/>
           </a:prstGeom>
           <a:ln w="19050">
             <a:solidFill>
-              <a:srgbClr val="7030A0"/>
+              <a:schemeClr val="accent6"/>
             </a:solidFill>
             <a:prstDash val="sysDash"/>
           </a:ln>
@@ -7013,7 +6935,7 @@
         </p:nvCxnSpPr>
         <p:spPr>
           <a:xfrm>
-            <a:off x="10598301" y="3051933"/>
+            <a:off x="10598301" y="3046881"/>
             <a:ext cx="1441017" cy="0"/>
           </a:xfrm>
           <a:prstGeom prst="straightConnector1">
@@ -7021,7 +6943,7 @@
           </a:prstGeom>
           <a:ln w="19050">
             <a:solidFill>
-              <a:srgbClr val="7030A0"/>
+              <a:schemeClr val="accent6"/>
             </a:solidFill>
             <a:prstDash val="sysDash"/>
             <a:headEnd type="arrow" w="med" len="med"/>
@@ -7059,8 +6981,8 @@
         </p:nvCxnSpPr>
         <p:spPr>
           <a:xfrm>
-            <a:off x="6377152" y="3340781"/>
-            <a:ext cx="2433162" cy="0"/>
+            <a:off x="6378129" y="3333224"/>
+            <a:ext cx="2447299" cy="0"/>
           </a:xfrm>
           <a:prstGeom prst="straightConnector1">
             <a:avLst/>
@@ -7110,11 +7032,11 @@
             <a:avLst/>
           </a:prstGeom>
           <a:solidFill>
-            <a:srgbClr val="7030A0"/>
+            <a:srgbClr val="BFBFBE"/>
           </a:solidFill>
           <a:ln w="19050">
             <a:solidFill>
-              <a:srgbClr val="7030A0"/>
+              <a:srgbClr val="BFBFBE"/>
             </a:solidFill>
           </a:ln>
           <a:effectLst/>
@@ -7139,16 +7061,16 @@
           <a:p>
             <a:pPr algn="ctr"/>
             <a:r>
-              <a:rPr lang="en-US" sz="1600" dirty="0">
+              <a:rPr lang="en-US" sz="1400">
                 <a:solidFill>
-                  <a:schemeClr val="bg1"/>
+                  <a:schemeClr val="tx1"/>
                 </a:solidFill>
               </a:rPr>
-              <a:t>: Player</a:t>
-            </a:r>
-            <a:endParaRPr lang="en-SG" sz="1600" dirty="0">
+              <a:t>:Player</a:t>
+            </a:r>
+            <a:endParaRPr lang="en-SG" sz="1400" dirty="0">
               <a:solidFill>
-                <a:schemeClr val="bg1"/>
+                <a:schemeClr val="tx1"/>
               </a:solidFill>
             </a:endParaRPr>
           </a:p>
@@ -7168,7 +7090,7 @@
         </p:nvSpPr>
         <p:spPr>
           <a:xfrm>
-            <a:off x="10767775" y="2411355"/>
+            <a:off x="10858610" y="2326576"/>
             <a:ext cx="841636" cy="184666"/>
           </a:xfrm>
           <a:prstGeom prst="rect">
@@ -7196,10 +7118,11 @@
             </a:lvl1pPr>
           </a:lstStyle>
           <a:p>
+            <a:pPr algn="ctr"/>
             <a:r>
               <a:rPr lang="en-US" sz="1200" dirty="0" err="1">
                 <a:solidFill>
-                  <a:srgbClr val="7030A0"/>
+                  <a:schemeClr val="accent6"/>
                 </a:solidFill>
               </a:rPr>
               <a:t>getFleet</a:t>
@@ -7207,18 +7130,11 @@
             <a:r>
               <a:rPr lang="en-US" sz="1200" dirty="0">
                 <a:solidFill>
-                  <a:srgbClr val="7030A0"/>
+                  <a:schemeClr val="accent6"/>
                 </a:solidFill>
               </a:rPr>
               <a:t>()</a:t>
             </a:r>
-            <a:endParaRPr lang="en-US" sz="1200" dirty="0">
-              <a:solidFill>
-                <a:schemeClr val="accent4">
-                  <a:lumMod val="75000"/>
-                </a:schemeClr>
-              </a:solidFill>
-            </a:endParaRPr>
           </a:p>
         </p:txBody>
       </p:sp>
@@ -7238,15 +7154,15 @@
         </p:nvCxnSpPr>
         <p:spPr>
           <a:xfrm>
-            <a:off x="10598301" y="2589887"/>
-            <a:ext cx="1455079" cy="0"/>
+            <a:off x="10561432" y="2556990"/>
+            <a:ext cx="1483214" cy="0"/>
           </a:xfrm>
           <a:prstGeom prst="straightConnector1">
             <a:avLst/>
           </a:prstGeom>
           <a:ln w="19050">
             <a:solidFill>
-              <a:srgbClr val="7030A0"/>
+              <a:schemeClr val="accent6"/>
             </a:solidFill>
             <a:tailEnd type="arrow"/>
           </a:ln>
@@ -7287,12 +7203,10 @@
             <a:avLst/>
           </a:prstGeom>
           <a:solidFill>
-            <a:srgbClr val="7030A0"/>
+            <a:schemeClr val="accent6"/>
           </a:solidFill>
           <a:ln w="19050">
-            <a:solidFill>
-              <a:srgbClr val="7030A0"/>
-            </a:solidFill>
+            <a:noFill/>
           </a:ln>
           <a:effectLst/>
         </p:spPr>
@@ -7316,14 +7230,14 @@
           <a:p>
             <a:pPr algn="ctr"/>
             <a:r>
-              <a:rPr lang="en-US" sz="1600" dirty="0">
+              <a:rPr lang="en-US" sz="1400">
                 <a:solidFill>
                   <a:schemeClr val="bg1"/>
                 </a:solidFill>
               </a:rPr>
-              <a:t>: Fleet</a:t>
-            </a:r>
-            <a:endParaRPr lang="en-SG" sz="1600" dirty="0">
+              <a:t>:Fleet</a:t>
+            </a:r>
+            <a:endParaRPr lang="en-SG" sz="1400" dirty="0">
               <a:solidFill>
                 <a:schemeClr val="bg1"/>
               </a:solidFill>
@@ -7345,7 +7259,7 @@
         </p:nvSpPr>
         <p:spPr>
           <a:xfrm>
-            <a:off x="12091759" y="2319022"/>
+            <a:off x="12336523" y="2332876"/>
             <a:ext cx="1157705" cy="184666"/>
           </a:xfrm>
           <a:prstGeom prst="rect">
@@ -7373,32 +7287,28 @@
             </a:lvl1pPr>
           </a:lstStyle>
           <a:p>
-            <a:r>
-              <a:rPr lang="en-US" sz="1200" dirty="0" err="1">
+            <a:pPr algn="l"/>
+            <a:r>
+              <a:rPr lang="en-US" sz="1200" err="1">
                 <a:solidFill>
-                  <a:srgbClr val="7030A0"/>
+                  <a:schemeClr val="accent6"/>
                 </a:solidFill>
               </a:rPr>
               <a:t>getAllTags</a:t>
             </a:r>
             <a:r>
-              <a:rPr lang="en-US" sz="1200" dirty="0">
+              <a:rPr lang="en-US" sz="1200">
                 <a:solidFill>
-                  <a:srgbClr val="7030A0"/>
+                  <a:schemeClr val="accent6"/>
                 </a:solidFill>
               </a:rPr>
               <a:t>()</a:t>
             </a:r>
-            <a:r>
-              <a:rPr lang="en-US" sz="1200" dirty="0">
-                <a:solidFill>
-                  <a:schemeClr val="accent4">
-                    <a:lumMod val="75000"/>
-                  </a:schemeClr>
-                </a:solidFill>
-              </a:rPr>
-              <a:t>()</a:t>
-            </a:r>
+            <a:endParaRPr lang="en-US" sz="1200" dirty="0">
+              <a:solidFill>
+                <a:schemeClr val="accent6"/>
+              </a:solidFill>
+            </a:endParaRPr>
           </a:p>
         </p:txBody>
       </p:sp>
@@ -7418,7 +7328,7 @@
         </p:nvCxnSpPr>
         <p:spPr>
           <a:xfrm>
-            <a:off x="12169989" y="2484992"/>
+            <a:off x="12173617" y="2561192"/>
             <a:ext cx="72937" cy="109922"/>
           </a:xfrm>
           <a:prstGeom prst="curvedConnector3">
@@ -7428,7 +7338,7 @@
           </a:prstGeom>
           <a:ln>
             <a:solidFill>
-              <a:srgbClr val="7030A0"/>
+              <a:schemeClr val="accent6"/>
             </a:solidFill>
             <a:tailEnd type="triangle"/>
           </a:ln>
@@ -7462,19 +7372,17 @@
         </p:nvSpPr>
         <p:spPr>
           <a:xfrm>
-            <a:off x="12120354" y="2589790"/>
+            <a:off x="12127611" y="2665990"/>
             <a:ext cx="129933" cy="233713"/>
           </a:xfrm>
           <a:prstGeom prst="rect">
             <a:avLst/>
           </a:prstGeom>
           <a:solidFill>
-            <a:srgbClr val="7030A0"/>
+            <a:schemeClr val="accent6"/>
           </a:solidFill>
           <a:ln>
-            <a:solidFill>
-              <a:srgbClr val="7030A0"/>
-            </a:solidFill>
+            <a:noFill/>
           </a:ln>
           <a:effectLst/>
         </p:spPr>
@@ -7517,7 +7425,7 @@
         </p:nvCxnSpPr>
         <p:spPr>
           <a:xfrm flipH="1">
-            <a:off x="12170949" y="2820324"/>
+            <a:off x="12167320" y="2896524"/>
             <a:ext cx="72953" cy="132809"/>
           </a:xfrm>
           <a:prstGeom prst="curvedConnector3">
@@ -7527,7 +7435,7 @@
           </a:prstGeom>
           <a:ln>
             <a:solidFill>
-              <a:srgbClr val="7030A0"/>
+              <a:schemeClr val="accent6"/>
             </a:solidFill>
             <a:prstDash val="sysDash"/>
             <a:tailEnd type="triangle"/>
@@ -7563,7 +7471,7 @@
         <p:grpSpPr>
           <a:xfrm>
             <a:off x="6801730" y="4633802"/>
-            <a:ext cx="1357466" cy="852598"/>
+            <a:ext cx="1217805" cy="852598"/>
             <a:chOff x="14256889" y="4659447"/>
             <a:chExt cx="1357466" cy="852598"/>
           </a:xfrm>
@@ -7618,7 +7526,7 @@
             <a:p>
               <a:pPr algn="ctr"/>
               <a:r>
-                <a:rPr lang="en-US" sz="1600" dirty="0">
+                <a:rPr lang="en-US" sz="1400" dirty="0">
                   <a:solidFill>
                     <a:schemeClr val="bg1"/>
                   </a:solidFill>
@@ -7629,14 +7537,14 @@
             <a:p>
               <a:pPr algn="ctr"/>
               <a:r>
-                <a:rPr lang="en-US" sz="1600" dirty="0">
+                <a:rPr lang="en-US" sz="1400" dirty="0">
                   <a:solidFill>
                     <a:schemeClr val="bg1"/>
                   </a:solidFill>
                 </a:rPr>
                 <a:t>Result</a:t>
               </a:r>
-              <a:endParaRPr lang="en-SG" sz="1600" dirty="0">
+              <a:endParaRPr lang="en-SG" sz="1400" dirty="0">
                 <a:solidFill>
                   <a:schemeClr val="bg1"/>
                 </a:solidFill>
@@ -7803,8 +7711,343 @@
         </p:nvCxnSpPr>
         <p:spPr>
           <a:xfrm>
-            <a:off x="6358098" y="5332135"/>
-            <a:ext cx="1181317" cy="0"/>
+            <a:off x="6358098" y="5325627"/>
+            <a:ext cx="1018886" cy="0"/>
+          </a:xfrm>
+          <a:prstGeom prst="straightConnector1">
+            <a:avLst/>
+          </a:prstGeom>
+          <a:ln w="19050">
+            <a:solidFill>
+              <a:srgbClr val="0070C0"/>
+            </a:solidFill>
+            <a:prstDash val="sysDash"/>
+            <a:headEnd type="arrow" w="med" len="med"/>
+            <a:tailEnd type="none" w="med" len="med"/>
+          </a:ln>
+        </p:spPr>
+        <p:style>
+          <a:lnRef idx="1">
+            <a:schemeClr val="accent1"/>
+          </a:lnRef>
+          <a:fillRef idx="0">
+            <a:schemeClr val="accent1"/>
+          </a:fillRef>
+          <a:effectRef idx="0">
+            <a:schemeClr val="accent1"/>
+          </a:effectRef>
+          <a:fontRef idx="minor">
+            <a:schemeClr val="tx1"/>
+          </a:fontRef>
+        </p:style>
+      </p:cxnSp>
+      <p:sp>
+        <p:nvSpPr>
+          <p:cNvPr id="160" name="Rectangle 159">
+            <a:extLst>
+              <a:ext uri="{FF2B5EF4-FFF2-40B4-BE49-F238E27FC236}">
+                <a16:creationId xmlns:a16="http://schemas.microsoft.com/office/drawing/2014/main" id="{BB7E46E7-A8BC-804A-81B1-D7AB1D98FE3E}"/>
+              </a:ext>
+            </a:extLst>
+          </p:cNvPr>
+          <p:cNvSpPr/>
+          <p:nvPr/>
+        </p:nvSpPr>
+        <p:spPr>
+          <a:xfrm>
+            <a:off x="10434287" y="2520602"/>
+            <a:ext cx="168894" cy="755491"/>
+          </a:xfrm>
+          <a:prstGeom prst="rect">
+            <a:avLst/>
+          </a:prstGeom>
+          <a:solidFill>
+            <a:srgbClr val="59595A"/>
+          </a:solidFill>
+          <a:ln>
+            <a:solidFill>
+              <a:srgbClr val="59595A"/>
+            </a:solidFill>
+          </a:ln>
+          <a:effectLst/>
+        </p:spPr>
+        <p:style>
+          <a:lnRef idx="1">
+            <a:schemeClr val="accent3"/>
+          </a:lnRef>
+          <a:fillRef idx="2">
+            <a:schemeClr val="accent3"/>
+          </a:fillRef>
+          <a:effectRef idx="1">
+            <a:schemeClr val="accent3"/>
+          </a:effectRef>
+          <a:fontRef idx="minor">
+            <a:schemeClr val="dk1"/>
+          </a:fontRef>
+        </p:style>
+        <p:txBody>
+          <a:bodyPr rtlCol="0" anchor="ctr"/>
+          <a:lstStyle/>
+          <a:p>
+            <a:pPr algn="ctr"/>
+            <a:endParaRPr lang="en-SG" sz="1400"/>
+          </a:p>
+        </p:txBody>
+      </p:sp>
+      <p:sp>
+        <p:nvSpPr>
+          <p:cNvPr id="172" name="Rectangle 171">
+            <a:extLst>
+              <a:ext uri="{FF2B5EF4-FFF2-40B4-BE49-F238E27FC236}">
+                <a16:creationId xmlns:a16="http://schemas.microsoft.com/office/drawing/2014/main" id="{7AE6C50E-906C-2C47-A0B7-0D79836B876A}"/>
+              </a:ext>
+            </a:extLst>
+          </p:cNvPr>
+          <p:cNvSpPr/>
+          <p:nvPr/>
+        </p:nvSpPr>
+        <p:spPr>
+          <a:xfrm>
+            <a:off x="12039316" y="2553855"/>
+            <a:ext cx="143448" cy="500154"/>
+          </a:xfrm>
+          <a:prstGeom prst="rect">
+            <a:avLst/>
+          </a:prstGeom>
+          <a:solidFill>
+            <a:schemeClr val="accent6"/>
+          </a:solidFill>
+          <a:ln>
+            <a:noFill/>
+          </a:ln>
+          <a:effectLst/>
+        </p:spPr>
+        <p:style>
+          <a:lnRef idx="1">
+            <a:schemeClr val="accent3"/>
+          </a:lnRef>
+          <a:fillRef idx="2">
+            <a:schemeClr val="accent3"/>
+          </a:fillRef>
+          <a:effectRef idx="1">
+            <a:schemeClr val="accent3"/>
+          </a:effectRef>
+          <a:fontRef idx="minor">
+            <a:schemeClr val="dk1"/>
+          </a:fontRef>
+        </p:style>
+        <p:txBody>
+          <a:bodyPr rtlCol="0" anchor="ctr"/>
+          <a:lstStyle/>
+          <a:p>
+            <a:pPr algn="ctr"/>
+            <a:endParaRPr lang="en-SG" sz="1400"/>
+          </a:p>
+        </p:txBody>
+      </p:sp>
+      <p:sp>
+        <p:nvSpPr>
+          <p:cNvPr id="65" name="Rectangle 64"/>
+          <p:cNvSpPr/>
+          <p:nvPr/>
+        </p:nvSpPr>
+        <p:spPr>
+          <a:xfrm>
+            <a:off x="6234526" y="2291508"/>
+            <a:ext cx="152401" cy="3378198"/>
+          </a:xfrm>
+          <a:prstGeom prst="rect">
+            <a:avLst/>
+          </a:prstGeom>
+          <a:solidFill>
+            <a:srgbClr val="0070C0"/>
+          </a:solidFill>
+          <a:ln>
+            <a:solidFill>
+              <a:srgbClr val="0070C0"/>
+            </a:solidFill>
+          </a:ln>
+          <a:effectLst/>
+        </p:spPr>
+        <p:style>
+          <a:lnRef idx="1">
+            <a:schemeClr val="accent3"/>
+          </a:lnRef>
+          <a:fillRef idx="2">
+            <a:schemeClr val="accent3"/>
+          </a:fillRef>
+          <a:effectRef idx="1">
+            <a:schemeClr val="accent3"/>
+          </a:effectRef>
+          <a:fontRef idx="minor">
+            <a:schemeClr val="dk1"/>
+          </a:fontRef>
+        </p:style>
+        <p:txBody>
+          <a:bodyPr rtlCol="0" anchor="ctr"/>
+          <a:lstStyle/>
+          <a:p>
+            <a:pPr algn="ctr"/>
+            <a:endParaRPr lang="en-SG" sz="1400"/>
+          </a:p>
+        </p:txBody>
+      </p:sp>
+      <p:cxnSp>
+        <p:nvCxnSpPr>
+          <p:cNvPr id="56" name="Straight Arrow Connector 55">
+            <a:extLst>
+              <a:ext uri="{FF2B5EF4-FFF2-40B4-BE49-F238E27FC236}">
+                <a16:creationId xmlns:a16="http://schemas.microsoft.com/office/drawing/2014/main" id="{0DB58D59-7609-5D46-AD51-AF085AD8B6F0}"/>
+              </a:ext>
+            </a:extLst>
+          </p:cNvPr>
+          <p:cNvCxnSpPr>
+            <a:cxnSpLocks/>
+          </p:cNvCxnSpPr>
+          <p:nvPr/>
+        </p:nvCxnSpPr>
+        <p:spPr>
+          <a:xfrm>
+            <a:off x="4238810" y="2000021"/>
+            <a:ext cx="1989366" cy="0"/>
+          </a:xfrm>
+          <a:prstGeom prst="straightConnector1">
+            <a:avLst/>
+          </a:prstGeom>
+          <a:ln w="19050">
+            <a:solidFill>
+              <a:srgbClr val="0070C0"/>
+            </a:solidFill>
+            <a:prstDash val="sysDash"/>
+            <a:headEnd type="arrow" w="med" len="med"/>
+            <a:tailEnd type="none" w="med" len="med"/>
+          </a:ln>
+        </p:spPr>
+        <p:style>
+          <a:lnRef idx="1">
+            <a:schemeClr val="accent1"/>
+          </a:lnRef>
+          <a:fillRef idx="0">
+            <a:schemeClr val="accent1"/>
+          </a:fillRef>
+          <a:effectRef idx="0">
+            <a:schemeClr val="accent1"/>
+          </a:effectRef>
+          <a:fontRef idx="minor">
+            <a:schemeClr val="tx1"/>
+          </a:fontRef>
+        </p:style>
+      </p:cxnSp>
+      <p:cxnSp>
+        <p:nvCxnSpPr>
+          <p:cNvPr id="58" name="Straight Arrow Connector 57">
+            <a:extLst>
+              <a:ext uri="{FF2B5EF4-FFF2-40B4-BE49-F238E27FC236}">
+                <a16:creationId xmlns:a16="http://schemas.microsoft.com/office/drawing/2014/main" id="{01CE5758-C53B-5944-8AD7-13EE837931A2}"/>
+              </a:ext>
+            </a:extLst>
+          </p:cNvPr>
+          <p:cNvCxnSpPr>
+            <a:cxnSpLocks/>
+          </p:cNvCxnSpPr>
+          <p:nvPr/>
+        </p:nvCxnSpPr>
+        <p:spPr>
+          <a:xfrm flipV="1">
+            <a:off x="4248944" y="2287230"/>
+            <a:ext cx="1993158" cy="1"/>
+          </a:xfrm>
+          <a:prstGeom prst="straightConnector1">
+            <a:avLst/>
+          </a:prstGeom>
+          <a:ln w="19050">
+            <a:solidFill>
+              <a:srgbClr val="0070C0"/>
+            </a:solidFill>
+            <a:tailEnd type="arrow"/>
+          </a:ln>
+        </p:spPr>
+        <p:style>
+          <a:lnRef idx="1">
+            <a:schemeClr val="accent1"/>
+          </a:lnRef>
+          <a:fillRef idx="0">
+            <a:schemeClr val="accent1"/>
+          </a:fillRef>
+          <a:effectRef idx="0">
+            <a:schemeClr val="accent1"/>
+          </a:effectRef>
+          <a:fontRef idx="minor">
+            <a:schemeClr val="tx1"/>
+          </a:fontRef>
+        </p:style>
+      </p:cxnSp>
+      <p:sp>
+        <p:nvSpPr>
+          <p:cNvPr id="63" name="TextBox 62">
+            <a:extLst>
+              <a:ext uri="{FF2B5EF4-FFF2-40B4-BE49-F238E27FC236}">
+                <a16:creationId xmlns:a16="http://schemas.microsoft.com/office/drawing/2014/main" id="{ED3CCE40-81F3-CB41-9A71-B582AACA7EC9}"/>
+              </a:ext>
+            </a:extLst>
+          </p:cNvPr>
+          <p:cNvSpPr txBox="1"/>
+          <p:nvPr/>
+        </p:nvSpPr>
+        <p:spPr>
+          <a:xfrm>
+            <a:off x="4180182" y="2038595"/>
+            <a:ext cx="2082984" cy="215444"/>
+          </a:xfrm>
+          <a:prstGeom prst="rect">
+            <a:avLst/>
+          </a:prstGeom>
+          <a:noFill/>
+        </p:spPr>
+        <p:txBody>
+          <a:bodyPr wrap="square" lIns="0" tIns="0" rIns="0" bIns="0" rtlCol="0">
+            <a:spAutoFit/>
+          </a:bodyPr>
+          <a:lstStyle>
+            <a:defPPr>
+              <a:defRPr lang="en-US"/>
+            </a:defPPr>
+            <a:lvl1pPr algn="r">
+              <a:defRPr sz="1400">
+                <a:solidFill>
+                  <a:srgbClr val="0070C0"/>
+                </a:solidFill>
+              </a:defRPr>
+            </a:lvl1pPr>
+          </a:lstStyle>
+          <a:p>
+            <a:pPr algn="ctr"/>
+            <a:r>
+              <a:rPr lang="en-US"/>
+              <a:t>parse(“listTags”)</a:t>
+            </a:r>
+            <a:endParaRPr lang="en-US" dirty="0"/>
+          </a:p>
+        </p:txBody>
+      </p:sp>
+      <p:cxnSp>
+        <p:nvCxnSpPr>
+          <p:cNvPr id="66" name="Straight Arrow Connector 65">
+            <a:extLst>
+              <a:ext uri="{FF2B5EF4-FFF2-40B4-BE49-F238E27FC236}">
+                <a16:creationId xmlns:a16="http://schemas.microsoft.com/office/drawing/2014/main" id="{26D5EABF-3525-EE4B-A5B5-BE9B82AAA189}"/>
+              </a:ext>
+            </a:extLst>
+          </p:cNvPr>
+          <p:cNvCxnSpPr>
+            <a:cxnSpLocks/>
+          </p:cNvCxnSpPr>
+          <p:nvPr/>
+        </p:nvCxnSpPr>
+        <p:spPr>
+          <a:xfrm>
+            <a:off x="4238810" y="3404286"/>
+            <a:ext cx="1989366" cy="0"/>
           </a:xfrm>
           <a:prstGeom prst="straightConnector1">
             <a:avLst/>

</xml_diff>

<commit_message>
Edited listTagSequenceDiagram lines not touching
</commit_message>
<xml_diff>
--- a/docs/diagrams/ListTagsSequenceDiagram.pptx
+++ b/docs/diagrams/ListTagsSequenceDiagram.pptx
@@ -2327,7 +2327,7 @@
           <a:p>
             <a:fld id="{F5CC4B3F-88C1-4FFA-B1B6-F41C21DC6924}" type="datetimeFigureOut">
               <a:rPr lang="en-US" smtClean="0"/>
-              <a:t>4/14/19</a:t>
+              <a:t>4/15/2019</a:t>
             </a:fld>
             <a:endParaRPr lang="en-US"/>
           </a:p>
@@ -2773,7 +2773,7 @@
           <a:p>
             <a:fld id="{78C97017-6FC3-485B-9764-EAC9E56C1D49}" type="datetimeFigureOut">
               <a:rPr lang="en-US" smtClean="0"/>
-              <a:t>4/14/19</a:t>
+              <a:t>4/15/2019</a:t>
             </a:fld>
             <a:endParaRPr lang="en-US"/>
           </a:p>
@@ -2941,7 +2941,7 @@
           <a:p>
             <a:fld id="{78C97017-6FC3-485B-9764-EAC9E56C1D49}" type="datetimeFigureOut">
               <a:rPr lang="en-US" smtClean="0"/>
-              <a:t>4/14/19</a:t>
+              <a:t>4/15/2019</a:t>
             </a:fld>
             <a:endParaRPr lang="en-US"/>
           </a:p>
@@ -3119,7 +3119,7 @@
           <a:p>
             <a:fld id="{78C97017-6FC3-485B-9764-EAC9E56C1D49}" type="datetimeFigureOut">
               <a:rPr lang="en-US" smtClean="0"/>
-              <a:t>4/14/19</a:t>
+              <a:t>4/15/2019</a:t>
             </a:fld>
             <a:endParaRPr lang="en-US"/>
           </a:p>
@@ -3287,7 +3287,7 @@
           <a:p>
             <a:fld id="{78C97017-6FC3-485B-9764-EAC9E56C1D49}" type="datetimeFigureOut">
               <a:rPr lang="en-US" smtClean="0"/>
-              <a:t>4/14/19</a:t>
+              <a:t>4/15/2019</a:t>
             </a:fld>
             <a:endParaRPr lang="en-US"/>
           </a:p>
@@ -3532,7 +3532,7 @@
           <a:p>
             <a:fld id="{78C97017-6FC3-485B-9764-EAC9E56C1D49}" type="datetimeFigureOut">
               <a:rPr lang="en-US" smtClean="0"/>
-              <a:t>4/14/19</a:t>
+              <a:t>4/15/2019</a:t>
             </a:fld>
             <a:endParaRPr lang="en-US"/>
           </a:p>
@@ -3817,7 +3817,7 @@
           <a:p>
             <a:fld id="{78C97017-6FC3-485B-9764-EAC9E56C1D49}" type="datetimeFigureOut">
               <a:rPr lang="en-US" smtClean="0"/>
-              <a:t>4/14/19</a:t>
+              <a:t>4/15/2019</a:t>
             </a:fld>
             <a:endParaRPr lang="en-US"/>
           </a:p>
@@ -4236,7 +4236,7 @@
           <a:p>
             <a:fld id="{78C97017-6FC3-485B-9764-EAC9E56C1D49}" type="datetimeFigureOut">
               <a:rPr lang="en-US" smtClean="0"/>
-              <a:t>4/14/19</a:t>
+              <a:t>4/15/2019</a:t>
             </a:fld>
             <a:endParaRPr lang="en-US"/>
           </a:p>
@@ -4353,7 +4353,7 @@
           <a:p>
             <a:fld id="{78C97017-6FC3-485B-9764-EAC9E56C1D49}" type="datetimeFigureOut">
               <a:rPr lang="en-US" smtClean="0"/>
-              <a:t>4/14/19</a:t>
+              <a:t>4/15/2019</a:t>
             </a:fld>
             <a:endParaRPr lang="en-US"/>
           </a:p>
@@ -4448,7 +4448,7 @@
           <a:p>
             <a:fld id="{78C97017-6FC3-485B-9764-EAC9E56C1D49}" type="datetimeFigureOut">
               <a:rPr lang="en-US" smtClean="0"/>
-              <a:t>4/14/19</a:t>
+              <a:t>4/15/2019</a:t>
             </a:fld>
             <a:endParaRPr lang="en-US"/>
           </a:p>
@@ -4723,7 +4723,7 @@
           <a:p>
             <a:fld id="{78C97017-6FC3-485B-9764-EAC9E56C1D49}" type="datetimeFigureOut">
               <a:rPr lang="en-US" smtClean="0"/>
-              <a:t>4/14/19</a:t>
+              <a:t>4/15/2019</a:t>
             </a:fld>
             <a:endParaRPr lang="en-US"/>
           </a:p>
@@ -4975,7 +4975,7 @@
           <a:p>
             <a:fld id="{78C97017-6FC3-485B-9764-EAC9E56C1D49}" type="datetimeFigureOut">
               <a:rPr lang="en-US" smtClean="0"/>
-              <a:t>4/14/19</a:t>
+              <a:t>4/15/2019</a:t>
             </a:fld>
             <a:endParaRPr lang="en-US"/>
           </a:p>
@@ -5186,7 +5186,7 @@
           <a:p>
             <a:fld id="{78C97017-6FC3-485B-9764-EAC9E56C1D49}" type="datetimeFigureOut">
               <a:rPr lang="en-US" smtClean="0"/>
-              <a:t>4/14/19</a:t>
+              <a:t>4/15/2019</a:t>
             </a:fld>
             <a:endParaRPr lang="en-US"/>
           </a:p>
@@ -5850,13 +5850,14 @@
           <p:cNvPr id="5" name="Straight Connector 4"/>
           <p:cNvCxnSpPr>
             <a:cxnSpLocks/>
+            <a:stCxn id="2" idx="2"/>
           </p:cNvCxnSpPr>
           <p:nvPr/>
         </p:nvCxnSpPr>
         <p:spPr>
-          <a:xfrm>
-            <a:off x="1724177" y="1042869"/>
-            <a:ext cx="0" cy="3460444"/>
+          <a:xfrm flipH="1">
+            <a:off x="1724177" y="913193"/>
+            <a:ext cx="8" cy="3590120"/>
           </a:xfrm>
           <a:prstGeom prst="line">
             <a:avLst/>
@@ -5953,8 +5954,8 @@
         </p:nvCxnSpPr>
         <p:spPr>
           <a:xfrm>
-            <a:off x="4163805" y="1042867"/>
-            <a:ext cx="0" cy="3478017"/>
+            <a:off x="4163805" y="942738"/>
+            <a:ext cx="0" cy="3578146"/>
           </a:xfrm>
           <a:prstGeom prst="line">
             <a:avLst/>

</xml_diff>